<commit_message>
Added slide of how AI completes US exams
</commit_message>
<xml_diff>
--- a/artificialintelligence/ArtificialIntelligenceTraining.pptx
+++ b/artificialintelligence/ArtificialIntelligenceTraining.pptx
@@ -5,7 +5,7 @@
     <p:sldMasterId id="2147483648" r:id="rId1"/>
   </p:sldMasterIdLst>
   <p:notesMasterIdLst>
-    <p:notesMasterId r:id="rId21"/>
+    <p:notesMasterId r:id="rId22"/>
   </p:notesMasterIdLst>
   <p:sldIdLst>
     <p:sldId id="256" r:id="rId2"/>
@@ -19,14 +19,15 @@
     <p:sldId id="265" r:id="rId10"/>
     <p:sldId id="267" r:id="rId11"/>
     <p:sldId id="269" r:id="rId12"/>
-    <p:sldId id="271" r:id="rId13"/>
-    <p:sldId id="272" r:id="rId14"/>
-    <p:sldId id="274" r:id="rId15"/>
-    <p:sldId id="275" r:id="rId16"/>
-    <p:sldId id="270" r:id="rId17"/>
-    <p:sldId id="277" r:id="rId18"/>
-    <p:sldId id="278" r:id="rId19"/>
-    <p:sldId id="279" r:id="rId20"/>
+    <p:sldId id="280" r:id="rId13"/>
+    <p:sldId id="271" r:id="rId14"/>
+    <p:sldId id="272" r:id="rId15"/>
+    <p:sldId id="274" r:id="rId16"/>
+    <p:sldId id="275" r:id="rId17"/>
+    <p:sldId id="270" r:id="rId18"/>
+    <p:sldId id="277" r:id="rId19"/>
+    <p:sldId id="278" r:id="rId20"/>
+    <p:sldId id="279" r:id="rId21"/>
   </p:sldIdLst>
   <p:sldSz cx="12192000" cy="6858000"/>
   <p:notesSz cx="6858000" cy="9144000"/>
@@ -145,6 +146,7 @@
           <p14:sldIdLst>
             <p14:sldId id="267"/>
             <p14:sldId id="269"/>
+            <p14:sldId id="280"/>
             <p14:sldId id="271"/>
             <p14:sldId id="272"/>
             <p14:sldId id="274"/>
@@ -156,6 +158,9 @@
           </p14:sldIdLst>
         </p14:section>
       </p14:sectionLst>
+    </p:ext>
+    <p:ext uri="{EFAFB233-063F-42B5-8137-9DF3F51BA10A}">
+      <p15:sldGuideLst xmlns:p15="http://schemas.microsoft.com/office/powerpoint/2012/main"/>
     </p:ext>
   </p:extLst>
 </p:presentation>
@@ -17565,7 +17570,7 @@
           <a:p>
             <a:fld id="{AFCD3C6E-66A5-4BE1-B033-C75FE743ECF0}" type="datetimeFigureOut">
               <a:rPr lang="LID4096" smtClean="0"/>
-              <a:t>06/10/2024</a:t>
+              <a:t>06/11/2024</a:t>
             </a:fld>
             <a:endParaRPr lang="LID4096"/>
           </a:p>
@@ -17877,6 +17882,230 @@
           <a:bodyPr/>
           <a:lstStyle/>
           <a:p>
+            <a:pPr algn="l">
+              <a:buFont typeface="+mj-lt"/>
+              <a:buAutoNum type="arabicPeriod"/>
+            </a:pPr>
+            <a:r>
+              <a:rPr lang="fi-FI" b="1" i="0" dirty="0">
+                <a:solidFill>
+                  <a:srgbClr val="111111"/>
+                </a:solidFill>
+                <a:effectLst/>
+                <a:highlight>
+                  <a:srgbClr val="F7F7F7"/>
+                </a:highlight>
+                <a:latin typeface="-apple-system"/>
+              </a:rPr>
+              <a:t>LSAT (Law School Admission Test)</a:t>
+            </a:r>
+            <a:r>
+              <a:rPr lang="fi-FI" b="0" i="0" dirty="0">
+                <a:solidFill>
+                  <a:srgbClr val="111111"/>
+                </a:solidFill>
+                <a:effectLst/>
+                <a:highlight>
+                  <a:srgbClr val="F7F7F7"/>
+                </a:highlight>
+                <a:latin typeface="-apple-system"/>
+              </a:rPr>
+              <a:t>: LSAT on oikeustieteellisen tiedekunnan pääsykoe Yhdysvalloissa. Se mittaa analyyttistä päättelykykyä ja luetun ymmärtämistä.</a:t>
+            </a:r>
+          </a:p>
+          <a:p>
+            <a:pPr algn="l">
+              <a:buFont typeface="+mj-lt"/>
+              <a:buAutoNum type="arabicPeriod"/>
+            </a:pPr>
+            <a:r>
+              <a:rPr lang="fi-FI" b="1" i="0" dirty="0">
+                <a:solidFill>
+                  <a:srgbClr val="111111"/>
+                </a:solidFill>
+                <a:effectLst/>
+                <a:highlight>
+                  <a:srgbClr val="F7F7F7"/>
+                </a:highlight>
+                <a:latin typeface="-apple-system"/>
+              </a:rPr>
+              <a:t>SAT Math ja SAT EBRW</a:t>
+            </a:r>
+            <a:r>
+              <a:rPr lang="fi-FI" b="0" i="0" dirty="0">
+                <a:solidFill>
+                  <a:srgbClr val="111111"/>
+                </a:solidFill>
+                <a:effectLst/>
+                <a:highlight>
+                  <a:srgbClr val="F7F7F7"/>
+                </a:highlight>
+                <a:latin typeface="-apple-system"/>
+              </a:rPr>
+              <a:t>: SAT on Yhdysvaltojen korkeakoulujen pääsykoe. “Math” testaa matemaattista osaamista, kun taas “EBRW” (Evidence-Based Reading and Writing) keskittyy lukemiseen ja kirjoittamiseen.</a:t>
+            </a:r>
+          </a:p>
+          <a:p>
+            <a:pPr algn="l">
+              <a:buFont typeface="+mj-lt"/>
+              <a:buAutoNum type="arabicPeriod"/>
+            </a:pPr>
+            <a:r>
+              <a:rPr lang="fi-FI" b="1" i="0" dirty="0">
+                <a:solidFill>
+                  <a:srgbClr val="111111"/>
+                </a:solidFill>
+                <a:effectLst/>
+                <a:highlight>
+                  <a:srgbClr val="F7F7F7"/>
+                </a:highlight>
+                <a:latin typeface="-apple-system"/>
+              </a:rPr>
+              <a:t>GRE Quant ja GRE Verbal</a:t>
+            </a:r>
+            <a:r>
+              <a:rPr lang="fi-FI" b="0" i="0" dirty="0">
+                <a:solidFill>
+                  <a:srgbClr val="111111"/>
+                </a:solidFill>
+                <a:effectLst/>
+                <a:highlight>
+                  <a:srgbClr val="F7F7F7"/>
+                </a:highlight>
+                <a:latin typeface="-apple-system"/>
+              </a:rPr>
+              <a:t>: GRE (Graduate Record Examination) on jatko-opiskelijoiden pääsykoe. “Quant” testaa matemaattista osaamista, ja “Verbal” keskittyy sanastoon ja luetun ymmärtämiseen.</a:t>
+            </a:r>
+          </a:p>
+          <a:p>
+            <a:pPr algn="l">
+              <a:buFont typeface="+mj-lt"/>
+              <a:buAutoNum type="arabicPeriod"/>
+            </a:pPr>
+            <a:r>
+              <a:rPr lang="fi-FI" b="1" i="0" dirty="0">
+                <a:solidFill>
+                  <a:srgbClr val="111111"/>
+                </a:solidFill>
+                <a:effectLst/>
+                <a:highlight>
+                  <a:srgbClr val="F7F7F7"/>
+                </a:highlight>
+                <a:latin typeface="-apple-system"/>
+              </a:rPr>
+              <a:t>AP-kokeet (Advanced Placement)</a:t>
+            </a:r>
+            <a:r>
+              <a:rPr lang="fi-FI" b="0" i="0" dirty="0">
+                <a:solidFill>
+                  <a:srgbClr val="111111"/>
+                </a:solidFill>
+                <a:effectLst/>
+                <a:highlight>
+                  <a:srgbClr val="F7F7F7"/>
+                </a:highlight>
+                <a:latin typeface="-apple-system"/>
+              </a:rPr>
+              <a:t>: AP-kokeet ovat Yhdysvaltojen lukion kursseihin liittyviä kokeita. Esimerkkejä ovat AP Biology, AP Chemistry, AP English Literature jne.</a:t>
+            </a:r>
+          </a:p>
+          <a:p>
+            <a:pPr algn="l">
+              <a:buFont typeface="+mj-lt"/>
+              <a:buAutoNum type="arabicPeriod"/>
+            </a:pPr>
+            <a:r>
+              <a:rPr lang="fi-FI" b="1" i="0" dirty="0">
+                <a:solidFill>
+                  <a:srgbClr val="111111"/>
+                </a:solidFill>
+                <a:effectLst/>
+                <a:highlight>
+                  <a:srgbClr val="F7F7F7"/>
+                </a:highlight>
+                <a:latin typeface="-apple-system"/>
+              </a:rPr>
+              <a:t>AMC 10 ja AMC 12</a:t>
+            </a:r>
+            <a:r>
+              <a:rPr lang="fi-FI" b="0" i="0" dirty="0">
+                <a:solidFill>
+                  <a:srgbClr val="111111"/>
+                </a:solidFill>
+                <a:effectLst/>
+                <a:highlight>
+                  <a:srgbClr val="F7F7F7"/>
+                </a:highlight>
+                <a:latin typeface="-apple-system"/>
+              </a:rPr>
+              <a:t>: Nämä ovat matematiikan kilpailuja, jotka on suunnattu koululaisille. AMC 10 on helpompi, ja AMC 12 vaativampi.</a:t>
+            </a:r>
+          </a:p>
+          <a:p>
+            <a:pPr algn="l">
+              <a:buFont typeface="+mj-lt"/>
+              <a:buAutoNum type="arabicPeriod"/>
+            </a:pPr>
+            <a:r>
+              <a:rPr lang="fi-FI" b="1" i="0" dirty="0">
+                <a:solidFill>
+                  <a:srgbClr val="111111"/>
+                </a:solidFill>
+                <a:effectLst/>
+                <a:highlight>
+                  <a:srgbClr val="F7F7F7"/>
+                </a:highlight>
+                <a:latin typeface="-apple-system"/>
+              </a:rPr>
+              <a:t>Codeforces Rating</a:t>
+            </a:r>
+            <a:r>
+              <a:rPr lang="fi-FI" b="0" i="0" dirty="0">
+                <a:solidFill>
+                  <a:srgbClr val="111111"/>
+                </a:solidFill>
+                <a:effectLst/>
+                <a:highlight>
+                  <a:srgbClr val="F7F7F7"/>
+                </a:highlight>
+                <a:latin typeface="-apple-system"/>
+              </a:rPr>
+              <a:t>: Codeforces on ohjelmointikilpailualusta, ja “rating” heijastaa käyttäjän suorituskykyä.</a:t>
+            </a:r>
+          </a:p>
+          <a:p>
+            <a:pPr algn="l">
+              <a:buFont typeface="+mj-lt"/>
+              <a:buAutoNum type="arabicPeriod"/>
+            </a:pPr>
+            <a:r>
+              <a:rPr lang="fi-FI" b="1" i="0" dirty="0">
+                <a:solidFill>
+                  <a:srgbClr val="111111"/>
+                </a:solidFill>
+                <a:effectLst/>
+                <a:highlight>
+                  <a:srgbClr val="F7F7F7"/>
+                </a:highlight>
+                <a:latin typeface="-apple-system"/>
+              </a:rPr>
+              <a:t>Uniform Bar Exam</a:t>
+            </a:r>
+            <a:r>
+              <a:rPr lang="fi-FI" b="0" i="0" dirty="0">
+                <a:solidFill>
+                  <a:srgbClr val="111111"/>
+                </a:solidFill>
+                <a:effectLst/>
+                <a:highlight>
+                  <a:srgbClr val="F7F7F7"/>
+                </a:highlight>
+                <a:latin typeface="-apple-system"/>
+              </a:rPr>
+              <a:t>: Tämä on Yhdysvaltojen asianajajatutkinnon koe</a:t>
+            </a:r>
+          </a:p>
+          <a:p>
             <a:endParaRPr lang="LID4096" dirty="0"/>
           </a:p>
         </p:txBody>
@@ -17898,7 +18127,7 @@
           <a:p>
             <a:fld id="{1E4B16E2-B510-454D-9710-F8CE63414B98}" type="slidenum">
               <a:rPr lang="LID4096" smtClean="0"/>
-              <a:t>13</a:t>
+              <a:t>12</a:t>
             </a:fld>
             <a:endParaRPr lang="LID4096"/>
           </a:p>
@@ -17907,7 +18136,7 @@
     </p:spTree>
     <p:extLst>
       <p:ext uri="{BB962C8B-B14F-4D97-AF65-F5344CB8AC3E}">
-        <p14:creationId xmlns:p14="http://schemas.microsoft.com/office/powerpoint/2010/main" val="3369081337"/>
+        <p14:creationId xmlns:p14="http://schemas.microsoft.com/office/powerpoint/2010/main" val="4106371767"/>
       </p:ext>
     </p:extLst>
   </p:cSld>
@@ -17961,15 +18190,6 @@
           <a:bodyPr/>
           <a:lstStyle/>
           <a:p>
-            <a:r>
-              <a:rPr lang="fi-FI" dirty="0"/>
-              <a:t>https://platform.openai.com/tokenizer </a:t>
-            </a:r>
-          </a:p>
-          <a:p>
-            <a:endParaRPr lang="fi-FI" dirty="0"/>
-          </a:p>
-          <a:p>
             <a:endParaRPr lang="LID4096" dirty="0"/>
           </a:p>
         </p:txBody>
@@ -17991,7 +18211,7 @@
           <a:p>
             <a:fld id="{1E4B16E2-B510-454D-9710-F8CE63414B98}" type="slidenum">
               <a:rPr lang="LID4096" smtClean="0"/>
-              <a:t>15</a:t>
+              <a:t>14</a:t>
             </a:fld>
             <a:endParaRPr lang="LID4096"/>
           </a:p>
@@ -18000,7 +18220,7 @@
     </p:spTree>
     <p:extLst>
       <p:ext uri="{BB962C8B-B14F-4D97-AF65-F5344CB8AC3E}">
-        <p14:creationId xmlns:p14="http://schemas.microsoft.com/office/powerpoint/2010/main" val="427263646"/>
+        <p14:creationId xmlns:p14="http://schemas.microsoft.com/office/powerpoint/2010/main" val="3369081337"/>
       </p:ext>
     </p:extLst>
   </p:cSld>
@@ -18084,7 +18304,100 @@
           <a:p>
             <a:fld id="{1E4B16E2-B510-454D-9710-F8CE63414B98}" type="slidenum">
               <a:rPr lang="LID4096" smtClean="0"/>
-              <a:t>17</a:t>
+              <a:t>16</a:t>
+            </a:fld>
+            <a:endParaRPr lang="LID4096"/>
+          </a:p>
+        </p:txBody>
+      </p:sp>
+    </p:spTree>
+    <p:extLst>
+      <p:ext uri="{BB962C8B-B14F-4D97-AF65-F5344CB8AC3E}">
+        <p14:creationId xmlns:p14="http://schemas.microsoft.com/office/powerpoint/2010/main" val="427263646"/>
+      </p:ext>
+    </p:extLst>
+  </p:cSld>
+  <p:clrMapOvr>
+    <a:masterClrMapping/>
+  </p:clrMapOvr>
+</p:notes>
+</file>
+
+<file path=ppt/notesSlides/notesSlide4.xml><?xml version="1.0" encoding="utf-8"?>
+<p:notes xmlns:a="http://schemas.openxmlformats.org/drawingml/2006/main" xmlns:r="http://schemas.openxmlformats.org/officeDocument/2006/relationships" xmlns:p="http://schemas.openxmlformats.org/presentationml/2006/main">
+  <p:cSld>
+    <p:spTree>
+      <p:nvGrpSpPr>
+        <p:cNvPr id="1" name=""/>
+        <p:cNvGrpSpPr/>
+        <p:nvPr/>
+      </p:nvGrpSpPr>
+      <p:grpSpPr>
+        <a:xfrm>
+          <a:off x="0" y="0"/>
+          <a:ext cx="0" cy="0"/>
+          <a:chOff x="0" y="0"/>
+          <a:chExt cx="0" cy="0"/>
+        </a:xfrm>
+      </p:grpSpPr>
+      <p:sp>
+        <p:nvSpPr>
+          <p:cNvPr id="2" name="Slide Image Placeholder 1"/>
+          <p:cNvSpPr>
+            <a:spLocks noGrp="1" noRot="1" noChangeAspect="1"/>
+          </p:cNvSpPr>
+          <p:nvPr>
+            <p:ph type="sldImg"/>
+          </p:nvPr>
+        </p:nvSpPr>
+        <p:spPr/>
+      </p:sp>
+      <p:sp>
+        <p:nvSpPr>
+          <p:cNvPr id="3" name="Notes Placeholder 2"/>
+          <p:cNvSpPr>
+            <a:spLocks noGrp="1"/>
+          </p:cNvSpPr>
+          <p:nvPr>
+            <p:ph type="body" idx="1"/>
+          </p:nvPr>
+        </p:nvSpPr>
+        <p:spPr/>
+        <p:txBody>
+          <a:bodyPr/>
+          <a:lstStyle/>
+          <a:p>
+            <a:r>
+              <a:rPr lang="fi-FI" dirty="0"/>
+              <a:t>https://platform.openai.com/tokenizer </a:t>
+            </a:r>
+          </a:p>
+          <a:p>
+            <a:endParaRPr lang="fi-FI" dirty="0"/>
+          </a:p>
+          <a:p>
+            <a:endParaRPr lang="LID4096" dirty="0"/>
+          </a:p>
+        </p:txBody>
+      </p:sp>
+      <p:sp>
+        <p:nvSpPr>
+          <p:cNvPr id="4" name="Slide Number Placeholder 3"/>
+          <p:cNvSpPr>
+            <a:spLocks noGrp="1"/>
+          </p:cNvSpPr>
+          <p:nvPr>
+            <p:ph type="sldNum" sz="quarter" idx="5"/>
+          </p:nvPr>
+        </p:nvSpPr>
+        <p:spPr/>
+        <p:txBody>
+          <a:bodyPr/>
+          <a:lstStyle/>
+          <a:p>
+            <a:fld id="{1E4B16E2-B510-454D-9710-F8CE63414B98}" type="slidenum">
+              <a:rPr lang="LID4096" smtClean="0"/>
+              <a:t>18</a:t>
             </a:fld>
             <a:endParaRPr lang="LID4096"/>
           </a:p>
@@ -18103,7 +18416,7 @@
 </p:notes>
 </file>
 
-<file path=ppt/notesSlides/notesSlide4.xml><?xml version="1.0" encoding="utf-8"?>
+<file path=ppt/notesSlides/notesSlide5.xml><?xml version="1.0" encoding="utf-8"?>
 <p:notes xmlns:a="http://schemas.openxmlformats.org/drawingml/2006/main" xmlns:r="http://schemas.openxmlformats.org/officeDocument/2006/relationships" xmlns:p="http://schemas.openxmlformats.org/presentationml/2006/main">
   <p:cSld>
     <p:spTree>
@@ -18215,7 +18528,7 @@
                 <a:tabLst/>
                 <a:defRPr/>
               </a:pPr>
-              <a:t>18</a:t>
+              <a:t>19</a:t>
             </a:fld>
             <a:endParaRPr kumimoji="0" lang="LID4096" sz="1200" b="0" i="0" u="none" strike="noStrike" kern="1200" cap="none" spc="0" normalizeH="0" baseline="0" noProof="0">
               <a:ln>
@@ -18247,7 +18560,7 @@
 </p:notes>
 </file>
 
-<file path=ppt/notesSlides/notesSlide5.xml><?xml version="1.0" encoding="utf-8"?>
+<file path=ppt/notesSlides/notesSlide6.xml><?xml version="1.0" encoding="utf-8"?>
 <p:notes xmlns:a="http://schemas.openxmlformats.org/drawingml/2006/main" xmlns:r="http://schemas.openxmlformats.org/officeDocument/2006/relationships" xmlns:p="http://schemas.openxmlformats.org/presentationml/2006/main">
   <p:cSld>
     <p:spTree>
@@ -18312,7 +18625,7 @@
           <a:p>
             <a:fld id="{1E4B16E2-B510-454D-9710-F8CE63414B98}" type="slidenum">
               <a:rPr lang="LID4096" smtClean="0"/>
-              <a:t>19</a:t>
+              <a:t>20</a:t>
             </a:fld>
             <a:endParaRPr lang="LID4096"/>
           </a:p>
@@ -18480,7 +18793,7 @@
           <a:p>
             <a:fld id="{E23A852A-1FE1-4693-ADFA-9F22F234A313}" type="datetimeFigureOut">
               <a:rPr lang="LID4096" smtClean="0"/>
-              <a:t>06/10/2024</a:t>
+              <a:t>06/11/2024</a:t>
             </a:fld>
             <a:endParaRPr lang="LID4096"/>
           </a:p>
@@ -18680,7 +18993,7 @@
           <a:p>
             <a:fld id="{E23A852A-1FE1-4693-ADFA-9F22F234A313}" type="datetimeFigureOut">
               <a:rPr lang="LID4096" smtClean="0"/>
-              <a:t>06/10/2024</a:t>
+              <a:t>06/11/2024</a:t>
             </a:fld>
             <a:endParaRPr lang="LID4096"/>
           </a:p>
@@ -18890,7 +19203,7 @@
           <a:p>
             <a:fld id="{E23A852A-1FE1-4693-ADFA-9F22F234A313}" type="datetimeFigureOut">
               <a:rPr lang="LID4096" smtClean="0"/>
-              <a:t>06/10/2024</a:t>
+              <a:t>06/11/2024</a:t>
             </a:fld>
             <a:endParaRPr lang="LID4096"/>
           </a:p>
@@ -19090,7 +19403,7 @@
           <a:p>
             <a:fld id="{E23A852A-1FE1-4693-ADFA-9F22F234A313}" type="datetimeFigureOut">
               <a:rPr lang="LID4096" smtClean="0"/>
-              <a:t>06/10/2024</a:t>
+              <a:t>06/11/2024</a:t>
             </a:fld>
             <a:endParaRPr lang="LID4096"/>
           </a:p>
@@ -19366,7 +19679,7 @@
           <a:p>
             <a:fld id="{E23A852A-1FE1-4693-ADFA-9F22F234A313}" type="datetimeFigureOut">
               <a:rPr lang="LID4096" smtClean="0"/>
-              <a:t>06/10/2024</a:t>
+              <a:t>06/11/2024</a:t>
             </a:fld>
             <a:endParaRPr lang="LID4096"/>
           </a:p>
@@ -19634,7 +19947,7 @@
           <a:p>
             <a:fld id="{E23A852A-1FE1-4693-ADFA-9F22F234A313}" type="datetimeFigureOut">
               <a:rPr lang="LID4096" smtClean="0"/>
-              <a:t>06/10/2024</a:t>
+              <a:t>06/11/2024</a:t>
             </a:fld>
             <a:endParaRPr lang="LID4096"/>
           </a:p>
@@ -20049,7 +20362,7 @@
           <a:p>
             <a:fld id="{E23A852A-1FE1-4693-ADFA-9F22F234A313}" type="datetimeFigureOut">
               <a:rPr lang="LID4096" smtClean="0"/>
-              <a:t>06/10/2024</a:t>
+              <a:t>06/11/2024</a:t>
             </a:fld>
             <a:endParaRPr lang="LID4096"/>
           </a:p>
@@ -20191,7 +20504,7 @@
           <a:p>
             <a:fld id="{E23A852A-1FE1-4693-ADFA-9F22F234A313}" type="datetimeFigureOut">
               <a:rPr lang="LID4096" smtClean="0"/>
-              <a:t>06/10/2024</a:t>
+              <a:t>06/11/2024</a:t>
             </a:fld>
             <a:endParaRPr lang="LID4096"/>
           </a:p>
@@ -20304,7 +20617,7 @@
           <a:p>
             <a:fld id="{E23A852A-1FE1-4693-ADFA-9F22F234A313}" type="datetimeFigureOut">
               <a:rPr lang="LID4096" smtClean="0"/>
-              <a:t>06/10/2024</a:t>
+              <a:t>06/11/2024</a:t>
             </a:fld>
             <a:endParaRPr lang="LID4096"/>
           </a:p>
@@ -20617,7 +20930,7 @@
           <a:p>
             <a:fld id="{E23A852A-1FE1-4693-ADFA-9F22F234A313}" type="datetimeFigureOut">
               <a:rPr lang="LID4096" smtClean="0"/>
-              <a:t>06/10/2024</a:t>
+              <a:t>06/11/2024</a:t>
             </a:fld>
             <a:endParaRPr lang="LID4096"/>
           </a:p>
@@ -20906,7 +21219,7 @@
           <a:p>
             <a:fld id="{E23A852A-1FE1-4693-ADFA-9F22F234A313}" type="datetimeFigureOut">
               <a:rPr lang="LID4096" smtClean="0"/>
-              <a:t>06/10/2024</a:t>
+              <a:t>06/11/2024</a:t>
             </a:fld>
             <a:endParaRPr lang="LID4096"/>
           </a:p>
@@ -21149,7 +21462,7 @@
           <a:p>
             <a:fld id="{E23A852A-1FE1-4693-ADFA-9F22F234A313}" type="datetimeFigureOut">
               <a:rPr lang="LID4096" smtClean="0"/>
-              <a:t>06/10/2024</a:t>
+              <a:t>06/11/2024</a:t>
             </a:fld>
             <a:endParaRPr lang="LID4096"/>
           </a:p>
@@ -22722,13 +23035,13 @@
   <p:clrMapOvr>
     <a:masterClrMapping/>
   </p:clrMapOvr>
-  <mc:AlternateContent xmlns:mc="http://schemas.openxmlformats.org/markup-compatibility/2006">
-    <mc:Choice xmlns:p14="http://schemas.microsoft.com/office/powerpoint/2010/main" Requires="p14">
+  <mc:AlternateContent xmlns:mc="http://schemas.openxmlformats.org/markup-compatibility/2006" xmlns:p14="http://schemas.microsoft.com/office/powerpoint/2010/main">
+    <mc:Choice Requires="p14">
       <p:transition spd="med" p14:dur="700">
         <p:fade/>
       </p:transition>
     </mc:Choice>
-    <mc:Fallback>
+    <mc:Fallback xmlns="">
       <p:transition spd="med">
         <p:fade/>
       </p:transition>
@@ -23344,13 +23657,13 @@
   <p:clrMapOvr>
     <a:masterClrMapping/>
   </p:clrMapOvr>
-  <mc:AlternateContent xmlns:mc="http://schemas.openxmlformats.org/markup-compatibility/2006">
-    <mc:Choice xmlns:p14="http://schemas.microsoft.com/office/powerpoint/2010/main" Requires="p14">
+  <mc:AlternateContent xmlns:mc="http://schemas.openxmlformats.org/markup-compatibility/2006" xmlns:p14="http://schemas.microsoft.com/office/powerpoint/2010/main">
+    <mc:Choice Requires="p14">
       <p:transition spd="med" p14:dur="700">
         <p:fade/>
       </p:transition>
     </mc:Choice>
-    <mc:Fallback>
+    <mc:Fallback xmlns="">
       <p:transition spd="med">
         <p:fade/>
       </p:transition>
@@ -23360,6 +23673,610 @@
 </file>
 
 <file path=ppt/slides/slide12.xml><?xml version="1.0" encoding="utf-8"?>
+<p:sld xmlns:a="http://schemas.openxmlformats.org/drawingml/2006/main" xmlns:r="http://schemas.openxmlformats.org/officeDocument/2006/relationships" xmlns:p="http://schemas.openxmlformats.org/presentationml/2006/main">
+  <p:cSld>
+    <p:bg>
+      <p:bgPr>
+        <a:solidFill>
+          <a:schemeClr val="bg1"/>
+        </a:solidFill>
+        <a:effectLst/>
+      </p:bgPr>
+    </p:bg>
+    <p:spTree>
+      <p:nvGrpSpPr>
+        <p:cNvPr id="1" name=""/>
+        <p:cNvGrpSpPr/>
+        <p:nvPr/>
+      </p:nvGrpSpPr>
+      <p:grpSpPr>
+        <a:xfrm>
+          <a:off x="0" y="0"/>
+          <a:ext cx="0" cy="0"/>
+          <a:chOff x="0" y="0"/>
+          <a:chExt cx="0" cy="0"/>
+        </a:xfrm>
+      </p:grpSpPr>
+      <p:sp useBgFill="1">
+        <p:nvSpPr>
+          <p:cNvPr id="8" name="Rectangle 7">
+            <a:extLst>
+              <a:ext uri="{FF2B5EF4-FFF2-40B4-BE49-F238E27FC236}">
+                <a16:creationId xmlns:a16="http://schemas.microsoft.com/office/drawing/2014/main" id="{A27089E4-C4B8-47AC-BDA4-294EFA7CB6BF}"/>
+              </a:ext>
+              <a:ext uri="{C183D7F6-B498-43B3-948B-1728B52AA6E4}">
+                <adec:decorative xmlns:adec="http://schemas.microsoft.com/office/drawing/2017/decorative" val="1"/>
+              </a:ext>
+            </a:extLst>
+          </p:cNvPr>
+          <p:cNvSpPr>
+            <a:spLocks noGrp="1" noRot="1" noChangeAspect="1" noMove="1" noResize="1" noEditPoints="1" noAdjustHandles="1" noChangeArrowheads="1" noChangeShapeType="1" noTextEdit="1"/>
+          </p:cNvSpPr>
+          <p:nvPr>
+            <p:extLst>
+              <p:ext uri="{386F3935-93C4-4BCD-93E2-E3B085C9AB24}">
+                <p16:designElem xmlns:p16="http://schemas.microsoft.com/office/powerpoint/2015/main" val="1"/>
+              </p:ext>
+            </p:extLst>
+          </p:nvPr>
+        </p:nvSpPr>
+        <p:spPr>
+          <a:xfrm>
+            <a:off x="0" y="0"/>
+            <a:ext cx="12192000" cy="6858001"/>
+          </a:xfrm>
+          <a:prstGeom prst="rect">
+            <a:avLst/>
+          </a:prstGeom>
+          <a:ln>
+            <a:noFill/>
+          </a:ln>
+        </p:spPr>
+        <p:style>
+          <a:lnRef idx="2">
+            <a:schemeClr val="accent1">
+              <a:shade val="50000"/>
+            </a:schemeClr>
+          </a:lnRef>
+          <a:fillRef idx="1">
+            <a:schemeClr val="accent1"/>
+          </a:fillRef>
+          <a:effectRef idx="0">
+            <a:schemeClr val="accent1"/>
+          </a:effectRef>
+          <a:fontRef idx="minor">
+            <a:schemeClr val="lt1"/>
+          </a:fontRef>
+        </p:style>
+        <p:txBody>
+          <a:bodyPr rtlCol="0" anchor="ctr"/>
+          <a:lstStyle/>
+          <a:p>
+            <a:pPr marL="0" marR="0" lvl="0" indent="0" algn="ctr" defTabSz="914400" rtl="0" eaLnBrk="1" fontAlgn="auto" latinLnBrk="0" hangingPunct="1">
+              <a:lnSpc>
+                <a:spcPct val="100000"/>
+              </a:lnSpc>
+              <a:spcBef>
+                <a:spcPts val="0"/>
+              </a:spcBef>
+              <a:spcAft>
+                <a:spcPts val="0"/>
+              </a:spcAft>
+              <a:buClrTx/>
+              <a:buSzTx/>
+              <a:buFontTx/>
+              <a:buNone/>
+              <a:tabLst/>
+              <a:defRPr/>
+            </a:pPr>
+            <a:endParaRPr kumimoji="0" lang="en-US" sz="1800" b="0" i="0" u="none" strike="noStrike" kern="1200" cap="none" spc="0" normalizeH="0" baseline="0" noProof="0">
+              <a:ln>
+                <a:noFill/>
+              </a:ln>
+              <a:solidFill>
+                <a:prstClr val="white"/>
+              </a:solidFill>
+              <a:effectLst/>
+              <a:uLnTx/>
+              <a:uFillTx/>
+              <a:latin typeface="Aptos" panose="02110004020202020204"/>
+              <a:ea typeface="+mn-ea"/>
+              <a:cs typeface="+mn-cs"/>
+            </a:endParaRPr>
+          </a:p>
+        </p:txBody>
+      </p:sp>
+      <p:sp>
+        <p:nvSpPr>
+          <p:cNvPr id="2" name="Title 1">
+            <a:extLst>
+              <a:ext uri="{FF2B5EF4-FFF2-40B4-BE49-F238E27FC236}">
+                <a16:creationId xmlns:a16="http://schemas.microsoft.com/office/drawing/2014/main" id="{29579FC1-044A-E059-482C-B6BAB684D9A3}"/>
+              </a:ext>
+            </a:extLst>
+          </p:cNvPr>
+          <p:cNvSpPr>
+            <a:spLocks noGrp="1"/>
+          </p:cNvSpPr>
+          <p:nvPr>
+            <p:ph type="title"/>
+          </p:nvPr>
+        </p:nvSpPr>
+        <p:spPr>
+          <a:xfrm>
+            <a:off x="1256350" y="144570"/>
+            <a:ext cx="10524317" cy="840722"/>
+          </a:xfrm>
+        </p:spPr>
+        <p:txBody>
+          <a:bodyPr anchor="b">
+            <a:normAutofit/>
+          </a:bodyPr>
+          <a:lstStyle/>
+          <a:p>
+            <a:r>
+              <a:rPr lang="en-US" sz="5400" dirty="0">
+                <a:solidFill>
+                  <a:schemeClr val="tx2"/>
+                </a:solidFill>
+              </a:rPr>
+              <a:t>Exam results</a:t>
+            </a:r>
+            <a:endParaRPr lang="LID4096" sz="5400" dirty="0">
+              <a:solidFill>
+                <a:schemeClr val="tx2"/>
+              </a:solidFill>
+            </a:endParaRPr>
+          </a:p>
+        </p:txBody>
+      </p:sp>
+      <p:sp>
+        <p:nvSpPr>
+          <p:cNvPr id="10" name="Rectangle 9">
+            <a:extLst>
+              <a:ext uri="{FF2B5EF4-FFF2-40B4-BE49-F238E27FC236}">
+                <a16:creationId xmlns:a16="http://schemas.microsoft.com/office/drawing/2014/main" id="{9BAFF925-4C7C-4B71-96F4-8FA90681BBF4}"/>
+              </a:ext>
+              <a:ext uri="{C183D7F6-B498-43B3-948B-1728B52AA6E4}">
+                <adec:decorative xmlns:adec="http://schemas.microsoft.com/office/drawing/2017/decorative" val="1"/>
+              </a:ext>
+            </a:extLst>
+          </p:cNvPr>
+          <p:cNvSpPr>
+            <a:spLocks noGrp="1" noRot="1" noChangeAspect="1" noMove="1" noResize="1" noEditPoints="1" noAdjustHandles="1" noChangeArrowheads="1" noChangeShapeType="1" noTextEdit="1"/>
+          </p:cNvSpPr>
+          <p:nvPr>
+            <p:extLst>
+              <p:ext uri="{386F3935-93C4-4BCD-93E2-E3B085C9AB24}">
+                <p16:designElem xmlns:p16="http://schemas.microsoft.com/office/powerpoint/2015/main" val="1"/>
+              </p:ext>
+            </p:extLst>
+          </p:nvPr>
+        </p:nvSpPr>
+        <p:spPr>
+          <a:xfrm>
+            <a:off x="0" y="0"/>
+            <a:ext cx="12192000" cy="1238031"/>
+          </a:xfrm>
+          <a:prstGeom prst="rect">
+            <a:avLst/>
+          </a:prstGeom>
+          <a:solidFill>
+            <a:schemeClr val="accent1">
+              <a:alpha val="20000"/>
+            </a:schemeClr>
+          </a:solidFill>
+          <a:ln>
+            <a:noFill/>
+          </a:ln>
+        </p:spPr>
+        <p:style>
+          <a:lnRef idx="2">
+            <a:schemeClr val="accent1">
+              <a:shade val="50000"/>
+            </a:schemeClr>
+          </a:lnRef>
+          <a:fillRef idx="1">
+            <a:schemeClr val="accent1"/>
+          </a:fillRef>
+          <a:effectRef idx="0">
+            <a:schemeClr val="accent1"/>
+          </a:effectRef>
+          <a:fontRef idx="minor">
+            <a:schemeClr val="lt1"/>
+          </a:fontRef>
+        </p:style>
+        <p:txBody>
+          <a:bodyPr rtlCol="0" anchor="ctr"/>
+          <a:lstStyle/>
+          <a:p>
+            <a:pPr marL="0" marR="0" lvl="0" indent="0" algn="ctr" defTabSz="914400" rtl="0" eaLnBrk="1" fontAlgn="auto" latinLnBrk="0" hangingPunct="1">
+              <a:lnSpc>
+                <a:spcPct val="100000"/>
+              </a:lnSpc>
+              <a:spcBef>
+                <a:spcPts val="0"/>
+              </a:spcBef>
+              <a:spcAft>
+                <a:spcPts val="0"/>
+              </a:spcAft>
+              <a:buClrTx/>
+              <a:buSzTx/>
+              <a:buFontTx/>
+              <a:buNone/>
+              <a:tabLst/>
+              <a:defRPr/>
+            </a:pPr>
+            <a:endParaRPr kumimoji="0" lang="en-US" sz="1800" b="0" i="0" u="none" strike="noStrike" kern="1200" cap="none" spc="0" normalizeH="0" baseline="0" noProof="0">
+              <a:ln>
+                <a:noFill/>
+              </a:ln>
+              <a:solidFill>
+                <a:prstClr val="white"/>
+              </a:solidFill>
+              <a:effectLst/>
+              <a:uLnTx/>
+              <a:uFillTx/>
+              <a:latin typeface="Aptos" panose="02110004020202020204"/>
+              <a:ea typeface="+mn-ea"/>
+              <a:cs typeface="+mn-cs"/>
+            </a:endParaRPr>
+          </a:p>
+        </p:txBody>
+      </p:sp>
+      <p:cxnSp>
+        <p:nvCxnSpPr>
+          <p:cNvPr id="12" name="Straight Connector 11">
+            <a:extLst>
+              <a:ext uri="{FF2B5EF4-FFF2-40B4-BE49-F238E27FC236}">
+                <a16:creationId xmlns:a16="http://schemas.microsoft.com/office/drawing/2014/main" id="{E653C820-2172-42C6-B50F-FD47A634BCD1}"/>
+              </a:ext>
+              <a:ext uri="{C183D7F6-B498-43B3-948B-1728B52AA6E4}">
+                <adec:decorative xmlns:adec="http://schemas.microsoft.com/office/drawing/2017/decorative" val="1"/>
+              </a:ext>
+            </a:extLst>
+          </p:cNvPr>
+          <p:cNvCxnSpPr>
+            <a:cxnSpLocks noGrp="1" noRot="1" noChangeAspect="1" noMove="1" noResize="1" noEditPoints="1" noAdjustHandles="1" noChangeArrowheads="1" noChangeShapeType="1"/>
+          </p:cNvCxnSpPr>
+          <p:nvPr>
+            <p:extLst>
+              <p:ext uri="{386F3935-93C4-4BCD-93E2-E3B085C9AB24}">
+                <p16:designElem xmlns:p16="http://schemas.microsoft.com/office/powerpoint/2015/main" val="1"/>
+              </p:ext>
+            </p:extLst>
+          </p:nvPr>
+        </p:nvCxnSpPr>
+        <p:spPr>
+          <a:xfrm flipH="1">
+            <a:off x="732568" y="246028"/>
+            <a:ext cx="255495" cy="546559"/>
+          </a:xfrm>
+          <a:prstGeom prst="line">
+            <a:avLst/>
+          </a:prstGeom>
+          <a:ln w="12700">
+            <a:solidFill>
+              <a:schemeClr val="tx2"/>
+            </a:solidFill>
+          </a:ln>
+        </p:spPr>
+        <p:style>
+          <a:lnRef idx="1">
+            <a:schemeClr val="accent1"/>
+          </a:lnRef>
+          <a:fillRef idx="0">
+            <a:schemeClr val="accent1"/>
+          </a:fillRef>
+          <a:effectRef idx="0">
+            <a:schemeClr val="accent1"/>
+          </a:effectRef>
+          <a:fontRef idx="minor">
+            <a:schemeClr val="tx1"/>
+          </a:fontRef>
+        </p:style>
+      </p:cxnSp>
+      <p:cxnSp>
+        <p:nvCxnSpPr>
+          <p:cNvPr id="14" name="Straight Connector 13">
+            <a:extLst>
+              <a:ext uri="{FF2B5EF4-FFF2-40B4-BE49-F238E27FC236}">
+                <a16:creationId xmlns:a16="http://schemas.microsoft.com/office/drawing/2014/main" id="{6FC534FC-C775-4490-AC5A-26BD39750A6E}"/>
+              </a:ext>
+              <a:ext uri="{C183D7F6-B498-43B3-948B-1728B52AA6E4}">
+                <adec:decorative xmlns:adec="http://schemas.microsoft.com/office/drawing/2017/decorative" val="1"/>
+              </a:ext>
+            </a:extLst>
+          </p:cNvPr>
+          <p:cNvCxnSpPr>
+            <a:cxnSpLocks noGrp="1" noRot="1" noChangeAspect="1" noMove="1" noResize="1" noEditPoints="1" noAdjustHandles="1" noChangeArrowheads="1" noChangeShapeType="1"/>
+          </p:cNvCxnSpPr>
+          <p:nvPr>
+            <p:extLst>
+              <p:ext uri="{386F3935-93C4-4BCD-93E2-E3B085C9AB24}">
+                <p16:designElem xmlns:p16="http://schemas.microsoft.com/office/powerpoint/2015/main" val="1"/>
+              </p:ext>
+            </p:extLst>
+          </p:nvPr>
+        </p:nvCxnSpPr>
+        <p:spPr>
+          <a:xfrm flipH="1">
+            <a:off x="840441" y="6522756"/>
+            <a:ext cx="10717187" cy="0"/>
+          </a:xfrm>
+          <a:prstGeom prst="line">
+            <a:avLst/>
+          </a:prstGeom>
+          <a:ln w="12700" cap="sq">
+            <a:solidFill>
+              <a:schemeClr val="tx2"/>
+            </a:solidFill>
+            <a:headEnd type="none"/>
+            <a:tailEnd type="none"/>
+          </a:ln>
+        </p:spPr>
+        <p:style>
+          <a:lnRef idx="1">
+            <a:schemeClr val="accent1"/>
+          </a:lnRef>
+          <a:fillRef idx="0">
+            <a:schemeClr val="accent1"/>
+          </a:fillRef>
+          <a:effectRef idx="0">
+            <a:schemeClr val="accent1"/>
+          </a:effectRef>
+          <a:fontRef idx="minor">
+            <a:schemeClr val="tx1"/>
+          </a:fontRef>
+        </p:style>
+      </p:cxnSp>
+      <p:grpSp>
+        <p:nvGrpSpPr>
+          <p:cNvPr id="16" name="Group 15">
+            <a:extLst>
+              <a:ext uri="{FF2B5EF4-FFF2-40B4-BE49-F238E27FC236}">
+                <a16:creationId xmlns:a16="http://schemas.microsoft.com/office/drawing/2014/main" id="{4BC3ACAC-BA31-4E67-A233-03EF1A10CF15}"/>
+              </a:ext>
+              <a:ext uri="{C183D7F6-B498-43B3-948B-1728B52AA6E4}">
+                <adec:decorative xmlns:adec="http://schemas.microsoft.com/office/drawing/2017/decorative" val="1"/>
+              </a:ext>
+            </a:extLst>
+          </p:cNvPr>
+          <p:cNvGrpSpPr>
+            <a:grpSpLocks noGrp="1" noUngrp="1" noRot="1" noChangeAspect="1" noMove="1" noResize="1"/>
+          </p:cNvGrpSpPr>
+          <p:nvPr>
+            <p:extLst>
+              <p:ext uri="{386F3935-93C4-4BCD-93E2-E3B085C9AB24}">
+                <p16:designElem xmlns:p16="http://schemas.microsoft.com/office/powerpoint/2015/main" val="1"/>
+              </p:ext>
+            </p:extLst>
+          </p:nvPr>
+        </p:nvGrpSpPr>
+        <p:grpSpPr>
+          <a:xfrm>
+            <a:off x="12829917" y="6400800"/>
+            <a:ext cx="338328" cy="240175"/>
+            <a:chOff x="4089400" y="933450"/>
+            <a:chExt cx="338328" cy="341938"/>
+          </a:xfrm>
+        </p:grpSpPr>
+        <p:cxnSp>
+          <p:nvCxnSpPr>
+            <p:cNvPr id="17" name="Straight Connector 16">
+              <a:extLst>
+                <a:ext uri="{FF2B5EF4-FFF2-40B4-BE49-F238E27FC236}">
+                  <a16:creationId xmlns:a16="http://schemas.microsoft.com/office/drawing/2014/main" id="{B15509C2-092A-4956-8523-79AEC9F4FBF1}"/>
+                </a:ext>
+                <a:ext uri="{C183D7F6-B498-43B3-948B-1728B52AA6E4}">
+                  <adec:decorative xmlns:adec="http://schemas.microsoft.com/office/drawing/2017/decorative" val="1"/>
+                </a:ext>
+              </a:extLst>
+            </p:cNvPr>
+            <p:cNvCxnSpPr>
+              <a:cxnSpLocks/>
+            </p:cNvCxnSpPr>
+            <p:nvPr>
+              <p:extLst>
+                <p:ext uri="{386F3935-93C4-4BCD-93E2-E3B085C9AB24}">
+                  <p16:designElem xmlns:p16="http://schemas.microsoft.com/office/powerpoint/2015/main" val="1"/>
+                </p:ext>
+              </p:extLst>
+            </p:nvPr>
+          </p:nvCxnSpPr>
+          <p:spPr>
+            <a:xfrm>
+              <a:off x="4258564" y="933450"/>
+              <a:ext cx="0" cy="341938"/>
+            </a:xfrm>
+            <a:prstGeom prst="line">
+              <a:avLst/>
+            </a:prstGeom>
+            <a:ln w="12700">
+              <a:solidFill>
+                <a:schemeClr val="tx2"/>
+              </a:solidFill>
+            </a:ln>
+          </p:spPr>
+          <p:style>
+            <a:lnRef idx="1">
+              <a:schemeClr val="accent1"/>
+            </a:lnRef>
+            <a:fillRef idx="0">
+              <a:schemeClr val="accent1"/>
+            </a:fillRef>
+            <a:effectRef idx="0">
+              <a:schemeClr val="accent1"/>
+            </a:effectRef>
+            <a:fontRef idx="minor">
+              <a:schemeClr val="tx1"/>
+            </a:fontRef>
+          </p:style>
+        </p:cxnSp>
+        <p:cxnSp>
+          <p:nvCxnSpPr>
+            <p:cNvPr id="18" name="Straight Connector 17">
+              <a:extLst>
+                <a:ext uri="{FF2B5EF4-FFF2-40B4-BE49-F238E27FC236}">
+                  <a16:creationId xmlns:a16="http://schemas.microsoft.com/office/drawing/2014/main" id="{304B9204-F74D-4578-8B3C-3DDC87E86106}"/>
+                </a:ext>
+                <a:ext uri="{C183D7F6-B498-43B3-948B-1728B52AA6E4}">
+                  <adec:decorative xmlns:adec="http://schemas.microsoft.com/office/drawing/2017/decorative" val="1"/>
+                </a:ext>
+              </a:extLst>
+            </p:cNvPr>
+            <p:cNvCxnSpPr>
+              <a:cxnSpLocks/>
+            </p:cNvCxnSpPr>
+            <p:nvPr>
+              <p:extLst>
+                <p:ext uri="{386F3935-93C4-4BCD-93E2-E3B085C9AB24}">
+                  <p16:designElem xmlns:p16="http://schemas.microsoft.com/office/powerpoint/2015/main" val="1"/>
+                </p:ext>
+              </p:extLst>
+            </p:nvPr>
+          </p:nvCxnSpPr>
+          <p:spPr>
+            <a:xfrm>
+              <a:off x="4089400" y="1104419"/>
+              <a:ext cx="338328" cy="0"/>
+            </a:xfrm>
+            <a:prstGeom prst="line">
+              <a:avLst/>
+            </a:prstGeom>
+            <a:ln w="12700">
+              <a:solidFill>
+                <a:schemeClr val="tx2"/>
+              </a:solidFill>
+            </a:ln>
+          </p:spPr>
+          <p:style>
+            <a:lnRef idx="1">
+              <a:schemeClr val="accent1"/>
+            </a:lnRef>
+            <a:fillRef idx="0">
+              <a:schemeClr val="accent1"/>
+            </a:fillRef>
+            <a:effectRef idx="0">
+              <a:schemeClr val="accent1"/>
+            </a:effectRef>
+            <a:fontRef idx="minor">
+              <a:schemeClr val="tx1"/>
+            </a:fontRef>
+          </p:style>
+        </p:cxnSp>
+      </p:grpSp>
+      <p:pic>
+        <p:nvPicPr>
+          <p:cNvPr id="1026" name="Picture 2" descr="The Olympics of AI: Benchmarking Machine Learning Systems | by Matthew  Stewart, PhD | Towards Data Science">
+            <a:extLst>
+              <a:ext uri="{FF2B5EF4-FFF2-40B4-BE49-F238E27FC236}">
+                <a16:creationId xmlns:a16="http://schemas.microsoft.com/office/drawing/2014/main" id="{AF77EB49-8D1D-B0B8-E725-7FE755C1A2E6}"/>
+              </a:ext>
+            </a:extLst>
+          </p:cNvPr>
+          <p:cNvPicPr>
+            <a:picLocks noChangeAspect="1" noChangeArrowheads="1"/>
+          </p:cNvPicPr>
+          <p:nvPr/>
+        </p:nvPicPr>
+        <p:blipFill>
+          <a:blip r:embed="rId3">
+            <a:extLst>
+              <a:ext uri="{28A0092B-C50C-407E-A947-70E740481C1C}">
+                <a14:useLocalDpi xmlns:a14="http://schemas.microsoft.com/office/drawing/2010/main" val="0"/>
+              </a:ext>
+            </a:extLst>
+          </a:blip>
+          <a:srcRect/>
+          <a:stretch>
+            <a:fillRect/>
+          </a:stretch>
+        </p:blipFill>
+        <p:spPr bwMode="auto">
+          <a:xfrm>
+            <a:off x="3590340" y="1559772"/>
+            <a:ext cx="5011319" cy="4484959"/>
+          </a:xfrm>
+          <a:prstGeom prst="rect">
+            <a:avLst/>
+          </a:prstGeom>
+          <a:noFill/>
+          <a:extLst>
+            <a:ext uri="{909E8E84-426E-40DD-AFC4-6F175D3DCCD1}">
+              <a14:hiddenFill xmlns:a14="http://schemas.microsoft.com/office/drawing/2010/main">
+                <a:solidFill>
+                  <a:srgbClr val="FFFFFF"/>
+                </a:solidFill>
+              </a14:hiddenFill>
+            </a:ext>
+          </a:extLst>
+        </p:spPr>
+      </p:pic>
+      <p:sp>
+        <p:nvSpPr>
+          <p:cNvPr id="4" name="TextBox 3">
+            <a:extLst>
+              <a:ext uri="{FF2B5EF4-FFF2-40B4-BE49-F238E27FC236}">
+                <a16:creationId xmlns:a16="http://schemas.microsoft.com/office/drawing/2014/main" id="{D99323BA-F06B-3224-DF7B-C0D5B3D698C9}"/>
+              </a:ext>
+            </a:extLst>
+          </p:cNvPr>
+          <p:cNvSpPr txBox="1"/>
+          <p:nvPr/>
+        </p:nvSpPr>
+        <p:spPr>
+          <a:xfrm>
+            <a:off x="7920756" y="6202669"/>
+            <a:ext cx="4007924" cy="307777"/>
+          </a:xfrm>
+          <a:prstGeom prst="rect">
+            <a:avLst/>
+          </a:prstGeom>
+          <a:noFill/>
+        </p:spPr>
+        <p:txBody>
+          <a:bodyPr wrap="square">
+            <a:spAutoFit/>
+          </a:bodyPr>
+          <a:lstStyle/>
+          <a:p>
+            <a:r>
+              <a:rPr lang="fi-FI" sz="1400" dirty="0">
+                <a:hlinkClick r:id="rId4"/>
+              </a:rPr>
+              <a:t>[2303.08774] GPT-4 Technical Report (arxiv.org)</a:t>
+            </a:r>
+            <a:endParaRPr lang="LID4096" sz="1400" dirty="0"/>
+          </a:p>
+        </p:txBody>
+      </p:sp>
+    </p:spTree>
+    <p:extLst>
+      <p:ext uri="{BB962C8B-B14F-4D97-AF65-F5344CB8AC3E}">
+        <p14:creationId xmlns:p14="http://schemas.microsoft.com/office/powerpoint/2010/main" val="3934971516"/>
+      </p:ext>
+    </p:extLst>
+  </p:cSld>
+  <p:clrMapOvr>
+    <a:masterClrMapping/>
+  </p:clrMapOvr>
+  <mc:AlternateContent xmlns:mc="http://schemas.openxmlformats.org/markup-compatibility/2006" xmlns:p14="http://schemas.microsoft.com/office/powerpoint/2010/main">
+    <mc:Choice Requires="p14">
+      <p:transition spd="med" p14:dur="700">
+        <p:fade/>
+      </p:transition>
+    </mc:Choice>
+    <mc:Fallback xmlns="">
+      <p:transition spd="med">
+        <p:fade/>
+      </p:transition>
+    </mc:Fallback>
+  </mc:AlternateContent>
+</p:sld>
+</file>
+
+<file path=ppt/slides/slide13.xml><?xml version="1.0" encoding="utf-8"?>
 <p:sld xmlns:a="http://schemas.openxmlformats.org/drawingml/2006/main" xmlns:r="http://schemas.openxmlformats.org/officeDocument/2006/relationships" xmlns:p="http://schemas.openxmlformats.org/presentationml/2006/main">
   <p:cSld>
     <p:bg>
@@ -23922,13 +24839,13 @@
   <p:clrMapOvr>
     <a:masterClrMapping/>
   </p:clrMapOvr>
-  <mc:AlternateContent xmlns:mc="http://schemas.openxmlformats.org/markup-compatibility/2006">
-    <mc:Choice xmlns:p14="http://schemas.microsoft.com/office/powerpoint/2010/main" Requires="p14">
+  <mc:AlternateContent xmlns:mc="http://schemas.openxmlformats.org/markup-compatibility/2006" xmlns:p14="http://schemas.microsoft.com/office/powerpoint/2010/main">
+    <mc:Choice Requires="p14">
       <p:transition spd="med" p14:dur="700">
         <p:fade/>
       </p:transition>
     </mc:Choice>
-    <mc:Fallback>
+    <mc:Fallback xmlns="">
       <p:transition spd="med">
         <p:fade/>
       </p:transition>
@@ -23937,7 +24854,7 @@
 </p:sld>
 </file>
 
-<file path=ppt/slides/slide13.xml><?xml version="1.0" encoding="utf-8"?>
+<file path=ppt/slides/slide14.xml><?xml version="1.0" encoding="utf-8"?>
 <p:sld xmlns:a="http://schemas.openxmlformats.org/drawingml/2006/main" xmlns:r="http://schemas.openxmlformats.org/officeDocument/2006/relationships" xmlns:p="http://schemas.openxmlformats.org/presentationml/2006/main">
   <p:cSld>
     <p:bg>
@@ -24620,13 +25537,13 @@
   <p:clrMapOvr>
     <a:masterClrMapping/>
   </p:clrMapOvr>
-  <mc:AlternateContent xmlns:mc="http://schemas.openxmlformats.org/markup-compatibility/2006">
-    <mc:Choice xmlns:p14="http://schemas.microsoft.com/office/powerpoint/2010/main" Requires="p14">
+  <mc:AlternateContent xmlns:mc="http://schemas.openxmlformats.org/markup-compatibility/2006" xmlns:p14="http://schemas.microsoft.com/office/powerpoint/2010/main">
+    <mc:Choice Requires="p14">
       <p:transition spd="med" p14:dur="700">
         <p:fade/>
       </p:transition>
     </mc:Choice>
-    <mc:Fallback>
+    <mc:Fallback xmlns="">
       <p:transition spd="med">
         <p:fade/>
       </p:transition>
@@ -24635,7 +25552,7 @@
 </p:sld>
 </file>
 
-<file path=ppt/slides/slide14.xml><?xml version="1.0" encoding="utf-8"?>
+<file path=ppt/slides/slide15.xml><?xml version="1.0" encoding="utf-8"?>
 <p:sld xmlns:a="http://schemas.openxmlformats.org/drawingml/2006/main" xmlns:r="http://schemas.openxmlformats.org/officeDocument/2006/relationships" xmlns:p="http://schemas.openxmlformats.org/presentationml/2006/main">
   <p:cSld>
     <p:bg>
@@ -25186,13 +26103,13 @@
   <p:clrMapOvr>
     <a:masterClrMapping/>
   </p:clrMapOvr>
-  <mc:AlternateContent xmlns:mc="http://schemas.openxmlformats.org/markup-compatibility/2006">
-    <mc:Choice xmlns:p14="http://schemas.microsoft.com/office/powerpoint/2010/main" Requires="p14">
+  <mc:AlternateContent xmlns:mc="http://schemas.openxmlformats.org/markup-compatibility/2006" xmlns:p14="http://schemas.microsoft.com/office/powerpoint/2010/main">
+    <mc:Choice Requires="p14">
       <p:transition spd="med" p14:dur="700">
         <p:fade/>
       </p:transition>
     </mc:Choice>
-    <mc:Fallback>
+    <mc:Fallback xmlns="">
       <p:transition spd="med">
         <p:fade/>
       </p:transition>
@@ -25201,7 +26118,7 @@
 </p:sld>
 </file>
 
-<file path=ppt/slides/slide15.xml><?xml version="1.0" encoding="utf-8"?>
+<file path=ppt/slides/slide16.xml><?xml version="1.0" encoding="utf-8"?>
 <p:sld xmlns:a="http://schemas.openxmlformats.org/drawingml/2006/main" xmlns:r="http://schemas.openxmlformats.org/officeDocument/2006/relationships" xmlns:p="http://schemas.openxmlformats.org/presentationml/2006/main">
   <p:cSld>
     <p:bg>
@@ -25764,13 +26681,13 @@
   <p:clrMapOvr>
     <a:masterClrMapping/>
   </p:clrMapOvr>
-  <mc:AlternateContent xmlns:mc="http://schemas.openxmlformats.org/markup-compatibility/2006">
-    <mc:Choice xmlns:p14="http://schemas.microsoft.com/office/powerpoint/2010/main" Requires="p14">
+  <mc:AlternateContent xmlns:mc="http://schemas.openxmlformats.org/markup-compatibility/2006" xmlns:p14="http://schemas.microsoft.com/office/powerpoint/2010/main">
+    <mc:Choice Requires="p14">
       <p:transition spd="med" p14:dur="700">
         <p:fade/>
       </p:transition>
     </mc:Choice>
-    <mc:Fallback>
+    <mc:Fallback xmlns="">
       <p:transition spd="med">
         <p:fade/>
       </p:transition>
@@ -25779,7 +26696,7 @@
 </p:sld>
 </file>
 
-<file path=ppt/slides/slide16.xml><?xml version="1.0" encoding="utf-8"?>
+<file path=ppt/slides/slide17.xml><?xml version="1.0" encoding="utf-8"?>
 <p:sld xmlns:a="http://schemas.openxmlformats.org/drawingml/2006/main" xmlns:r="http://schemas.openxmlformats.org/officeDocument/2006/relationships" xmlns:p="http://schemas.openxmlformats.org/presentationml/2006/main">
   <p:cSld>
     <p:bg>
@@ -26347,13 +27264,13 @@
   <p:clrMapOvr>
     <a:masterClrMapping/>
   </p:clrMapOvr>
-  <mc:AlternateContent xmlns:mc="http://schemas.openxmlformats.org/markup-compatibility/2006">
-    <mc:Choice xmlns:p14="http://schemas.microsoft.com/office/powerpoint/2010/main" Requires="p14">
+  <mc:AlternateContent xmlns:mc="http://schemas.openxmlformats.org/markup-compatibility/2006" xmlns:p14="http://schemas.microsoft.com/office/powerpoint/2010/main">
+    <mc:Choice Requires="p14">
       <p:transition spd="med" p14:dur="700">
         <p:fade/>
       </p:transition>
     </mc:Choice>
-    <mc:Fallback>
+    <mc:Fallback xmlns="">
       <p:transition spd="med">
         <p:fade/>
       </p:transition>
@@ -26362,7 +27279,7 @@
 </p:sld>
 </file>
 
-<file path=ppt/slides/slide17.xml><?xml version="1.0" encoding="utf-8"?>
+<file path=ppt/slides/slide18.xml><?xml version="1.0" encoding="utf-8"?>
 <p:sld xmlns:a="http://schemas.openxmlformats.org/drawingml/2006/main" xmlns:r="http://schemas.openxmlformats.org/officeDocument/2006/relationships" xmlns:p="http://schemas.openxmlformats.org/presentationml/2006/main">
   <p:cSld>
     <p:bg>
@@ -26950,13 +27867,13 @@
   <p:clrMapOvr>
     <a:masterClrMapping/>
   </p:clrMapOvr>
-  <mc:AlternateContent xmlns:mc="http://schemas.openxmlformats.org/markup-compatibility/2006">
-    <mc:Choice xmlns:p14="http://schemas.microsoft.com/office/powerpoint/2010/main" Requires="p14">
+  <mc:AlternateContent xmlns:mc="http://schemas.openxmlformats.org/markup-compatibility/2006" xmlns:p14="http://schemas.microsoft.com/office/powerpoint/2010/main">
+    <mc:Choice Requires="p14">
       <p:transition spd="med" p14:dur="700">
         <p:fade/>
       </p:transition>
     </mc:Choice>
-    <mc:Fallback>
+    <mc:Fallback xmlns="">
       <p:transition spd="med">
         <p:fade/>
       </p:transition>
@@ -26965,7 +27882,7 @@
 </p:sld>
 </file>
 
-<file path=ppt/slides/slide18.xml><?xml version="1.0" encoding="utf-8"?>
+<file path=ppt/slides/slide19.xml><?xml version="1.0" encoding="utf-8"?>
 <p:sld xmlns:a="http://schemas.openxmlformats.org/drawingml/2006/main" xmlns:r="http://schemas.openxmlformats.org/officeDocument/2006/relationships" xmlns:p="http://schemas.openxmlformats.org/presentationml/2006/main">
   <p:cSld>
     <p:bg>
@@ -27880,13 +28797,13 @@
   <p:clrMapOvr>
     <a:masterClrMapping/>
   </p:clrMapOvr>
-  <mc:AlternateContent xmlns:mc="http://schemas.openxmlformats.org/markup-compatibility/2006">
-    <mc:Choice xmlns:p14="http://schemas.microsoft.com/office/powerpoint/2010/main" Requires="p14">
+  <mc:AlternateContent xmlns:mc="http://schemas.openxmlformats.org/markup-compatibility/2006" xmlns:p14="http://schemas.microsoft.com/office/powerpoint/2010/main">
+    <mc:Choice Requires="p14">
       <p:transition spd="med" p14:dur="700">
         <p:fade/>
       </p:transition>
     </mc:Choice>
-    <mc:Fallback>
+    <mc:Fallback xmlns="">
       <p:transition spd="med">
         <p:fade/>
       </p:transition>
@@ -27895,7 +28812,585 @@
 </p:sld>
 </file>
 
-<file path=ppt/slides/slide19.xml><?xml version="1.0" encoding="utf-8"?>
+<file path=ppt/slides/slide2.xml><?xml version="1.0" encoding="utf-8"?>
+<p:sld xmlns:a="http://schemas.openxmlformats.org/drawingml/2006/main" xmlns:r="http://schemas.openxmlformats.org/officeDocument/2006/relationships" xmlns:p="http://schemas.openxmlformats.org/presentationml/2006/main">
+  <p:cSld>
+    <p:bg>
+      <p:bgPr>
+        <a:solidFill>
+          <a:schemeClr val="bg1"/>
+        </a:solidFill>
+        <a:effectLst/>
+      </p:bgPr>
+    </p:bg>
+    <p:spTree>
+      <p:nvGrpSpPr>
+        <p:cNvPr id="1" name=""/>
+        <p:cNvGrpSpPr/>
+        <p:nvPr/>
+      </p:nvGrpSpPr>
+      <p:grpSpPr>
+        <a:xfrm>
+          <a:off x="0" y="0"/>
+          <a:ext cx="0" cy="0"/>
+          <a:chOff x="0" y="0"/>
+          <a:chExt cx="0" cy="0"/>
+        </a:xfrm>
+      </p:grpSpPr>
+      <p:sp useBgFill="1">
+        <p:nvSpPr>
+          <p:cNvPr id="8" name="Rectangle 7">
+            <a:extLst>
+              <a:ext uri="{FF2B5EF4-FFF2-40B4-BE49-F238E27FC236}">
+                <a16:creationId xmlns:a16="http://schemas.microsoft.com/office/drawing/2014/main" id="{A27089E4-C4B8-47AC-BDA4-294EFA7CB6BF}"/>
+              </a:ext>
+              <a:ext uri="{C183D7F6-B498-43B3-948B-1728B52AA6E4}">
+                <adec:decorative xmlns:adec="http://schemas.microsoft.com/office/drawing/2017/decorative" val="1"/>
+              </a:ext>
+            </a:extLst>
+          </p:cNvPr>
+          <p:cNvSpPr>
+            <a:spLocks noGrp="1" noRot="1" noChangeAspect="1" noMove="1" noResize="1" noEditPoints="1" noAdjustHandles="1" noChangeArrowheads="1" noChangeShapeType="1" noTextEdit="1"/>
+          </p:cNvSpPr>
+          <p:nvPr>
+            <p:extLst>
+              <p:ext uri="{386F3935-93C4-4BCD-93E2-E3B085C9AB24}">
+                <p16:designElem xmlns:p16="http://schemas.microsoft.com/office/powerpoint/2015/main" val="1"/>
+              </p:ext>
+            </p:extLst>
+          </p:nvPr>
+        </p:nvSpPr>
+        <p:spPr>
+          <a:xfrm>
+            <a:off x="0" y="0"/>
+            <a:ext cx="12192000" cy="6858001"/>
+          </a:xfrm>
+          <a:prstGeom prst="rect">
+            <a:avLst/>
+          </a:prstGeom>
+          <a:ln>
+            <a:noFill/>
+          </a:ln>
+        </p:spPr>
+        <p:style>
+          <a:lnRef idx="2">
+            <a:schemeClr val="accent1">
+              <a:shade val="50000"/>
+            </a:schemeClr>
+          </a:lnRef>
+          <a:fillRef idx="1">
+            <a:schemeClr val="accent1"/>
+          </a:fillRef>
+          <a:effectRef idx="0">
+            <a:schemeClr val="accent1"/>
+          </a:effectRef>
+          <a:fontRef idx="minor">
+            <a:schemeClr val="lt1"/>
+          </a:fontRef>
+        </p:style>
+        <p:txBody>
+          <a:bodyPr rtlCol="0" anchor="ctr"/>
+          <a:lstStyle/>
+          <a:p>
+            <a:pPr algn="ctr"/>
+            <a:endParaRPr lang="en-US"/>
+          </a:p>
+        </p:txBody>
+      </p:sp>
+      <p:sp>
+        <p:nvSpPr>
+          <p:cNvPr id="2" name="Title 1">
+            <a:extLst>
+              <a:ext uri="{FF2B5EF4-FFF2-40B4-BE49-F238E27FC236}">
+                <a16:creationId xmlns:a16="http://schemas.microsoft.com/office/drawing/2014/main" id="{29579FC1-044A-E059-482C-B6BAB684D9A3}"/>
+              </a:ext>
+            </a:extLst>
+          </p:cNvPr>
+          <p:cNvSpPr>
+            <a:spLocks noGrp="1"/>
+          </p:cNvSpPr>
+          <p:nvPr>
+            <p:ph type="title"/>
+          </p:nvPr>
+        </p:nvSpPr>
+        <p:spPr>
+          <a:xfrm>
+            <a:off x="731520" y="1254408"/>
+            <a:ext cx="6092859" cy="2450817"/>
+          </a:xfrm>
+        </p:spPr>
+        <p:txBody>
+          <a:bodyPr anchor="b">
+            <a:normAutofit/>
+          </a:bodyPr>
+          <a:lstStyle/>
+          <a:p>
+            <a:r>
+              <a:rPr lang="en-US" sz="5400">
+                <a:solidFill>
+                  <a:schemeClr val="tx2"/>
+                </a:solidFill>
+              </a:rPr>
+              <a:t>Agenda</a:t>
+            </a:r>
+            <a:endParaRPr lang="LID4096" sz="5400">
+              <a:solidFill>
+                <a:schemeClr val="tx2"/>
+              </a:solidFill>
+            </a:endParaRPr>
+          </a:p>
+        </p:txBody>
+      </p:sp>
+      <p:sp>
+        <p:nvSpPr>
+          <p:cNvPr id="10" name="Rectangle 9">
+            <a:extLst>
+              <a:ext uri="{FF2B5EF4-FFF2-40B4-BE49-F238E27FC236}">
+                <a16:creationId xmlns:a16="http://schemas.microsoft.com/office/drawing/2014/main" id="{9BAFF925-4C7C-4B71-96F4-8FA90681BBF4}"/>
+              </a:ext>
+              <a:ext uri="{C183D7F6-B498-43B3-948B-1728B52AA6E4}">
+                <adec:decorative xmlns:adec="http://schemas.microsoft.com/office/drawing/2017/decorative" val="1"/>
+              </a:ext>
+            </a:extLst>
+          </p:cNvPr>
+          <p:cNvSpPr>
+            <a:spLocks noGrp="1" noRot="1" noChangeAspect="1" noMove="1" noResize="1" noEditPoints="1" noAdjustHandles="1" noChangeArrowheads="1" noChangeShapeType="1" noTextEdit="1"/>
+          </p:cNvSpPr>
+          <p:nvPr>
+            <p:extLst>
+              <p:ext uri="{386F3935-93C4-4BCD-93E2-E3B085C9AB24}">
+                <p16:designElem xmlns:p16="http://schemas.microsoft.com/office/powerpoint/2015/main" val="1"/>
+              </p:ext>
+            </p:extLst>
+          </p:nvPr>
+        </p:nvSpPr>
+        <p:spPr>
+          <a:xfrm>
+            <a:off x="0" y="0"/>
+            <a:ext cx="12192000" cy="1238031"/>
+          </a:xfrm>
+          <a:prstGeom prst="rect">
+            <a:avLst/>
+          </a:prstGeom>
+          <a:solidFill>
+            <a:schemeClr val="accent1">
+              <a:alpha val="20000"/>
+            </a:schemeClr>
+          </a:solidFill>
+          <a:ln>
+            <a:noFill/>
+          </a:ln>
+        </p:spPr>
+        <p:style>
+          <a:lnRef idx="2">
+            <a:schemeClr val="accent1">
+              <a:shade val="50000"/>
+            </a:schemeClr>
+          </a:lnRef>
+          <a:fillRef idx="1">
+            <a:schemeClr val="accent1"/>
+          </a:fillRef>
+          <a:effectRef idx="0">
+            <a:schemeClr val="accent1"/>
+          </a:effectRef>
+          <a:fontRef idx="minor">
+            <a:schemeClr val="lt1"/>
+          </a:fontRef>
+        </p:style>
+        <p:txBody>
+          <a:bodyPr rtlCol="0" anchor="ctr"/>
+          <a:lstStyle/>
+          <a:p>
+            <a:pPr algn="ctr"/>
+            <a:endParaRPr lang="en-US"/>
+          </a:p>
+        </p:txBody>
+      </p:sp>
+      <p:cxnSp>
+        <p:nvCxnSpPr>
+          <p:cNvPr id="12" name="Straight Connector 11">
+            <a:extLst>
+              <a:ext uri="{FF2B5EF4-FFF2-40B4-BE49-F238E27FC236}">
+                <a16:creationId xmlns:a16="http://schemas.microsoft.com/office/drawing/2014/main" id="{E653C820-2172-42C6-B50F-FD47A634BCD1}"/>
+              </a:ext>
+              <a:ext uri="{C183D7F6-B498-43B3-948B-1728B52AA6E4}">
+                <adec:decorative xmlns:adec="http://schemas.microsoft.com/office/drawing/2017/decorative" val="1"/>
+              </a:ext>
+            </a:extLst>
+          </p:cNvPr>
+          <p:cNvCxnSpPr>
+            <a:cxnSpLocks noGrp="1" noRot="1" noChangeAspect="1" noMove="1" noResize="1" noEditPoints="1" noAdjustHandles="1" noChangeArrowheads="1" noChangeShapeType="1"/>
+          </p:cNvCxnSpPr>
+          <p:nvPr>
+            <p:extLst>
+              <p:ext uri="{386F3935-93C4-4BCD-93E2-E3B085C9AB24}">
+                <p16:designElem xmlns:p16="http://schemas.microsoft.com/office/powerpoint/2015/main" val="1"/>
+              </p:ext>
+            </p:extLst>
+          </p:nvPr>
+        </p:nvCxnSpPr>
+        <p:spPr>
+          <a:xfrm flipH="1">
+            <a:off x="732568" y="246028"/>
+            <a:ext cx="255495" cy="546559"/>
+          </a:xfrm>
+          <a:prstGeom prst="line">
+            <a:avLst/>
+          </a:prstGeom>
+          <a:ln w="12700">
+            <a:solidFill>
+              <a:schemeClr val="tx2"/>
+            </a:solidFill>
+          </a:ln>
+        </p:spPr>
+        <p:style>
+          <a:lnRef idx="1">
+            <a:schemeClr val="accent1"/>
+          </a:lnRef>
+          <a:fillRef idx="0">
+            <a:schemeClr val="accent1"/>
+          </a:fillRef>
+          <a:effectRef idx="0">
+            <a:schemeClr val="accent1"/>
+          </a:effectRef>
+          <a:fontRef idx="minor">
+            <a:schemeClr val="tx1"/>
+          </a:fontRef>
+        </p:style>
+      </p:cxnSp>
+      <p:sp>
+        <p:nvSpPr>
+          <p:cNvPr id="3" name="Content Placeholder 2">
+            <a:extLst>
+              <a:ext uri="{FF2B5EF4-FFF2-40B4-BE49-F238E27FC236}">
+                <a16:creationId xmlns:a16="http://schemas.microsoft.com/office/drawing/2014/main" id="{0C43465B-9709-C5E0-AF80-C1B90B49BF4A}"/>
+              </a:ext>
+            </a:extLst>
+          </p:cNvPr>
+          <p:cNvSpPr>
+            <a:spLocks noGrp="1"/>
+          </p:cNvSpPr>
+          <p:nvPr>
+            <p:ph idx="1"/>
+          </p:nvPr>
+        </p:nvSpPr>
+        <p:spPr>
+          <a:xfrm>
+            <a:off x="731520" y="4069080"/>
+            <a:ext cx="6082281" cy="2042605"/>
+          </a:xfrm>
+        </p:spPr>
+        <p:txBody>
+          <a:bodyPr anchor="t">
+            <a:normAutofit/>
+          </a:bodyPr>
+          <a:lstStyle/>
+          <a:p>
+            <a:r>
+              <a:rPr lang="en-US" sz="1100" dirty="0">
+                <a:solidFill>
+                  <a:schemeClr val="tx2"/>
+                </a:solidFill>
+              </a:rPr>
+              <a:t>What is AI?</a:t>
+            </a:r>
+          </a:p>
+          <a:p>
+            <a:r>
+              <a:rPr lang="en-US" sz="1100" dirty="0">
+                <a:solidFill>
+                  <a:schemeClr val="tx2"/>
+                </a:solidFill>
+              </a:rPr>
+              <a:t>Machine learning </a:t>
+            </a:r>
+          </a:p>
+          <a:p>
+            <a:r>
+              <a:rPr lang="en-US" sz="1100" dirty="0">
+                <a:solidFill>
+                  <a:schemeClr val="tx2"/>
+                </a:solidFill>
+              </a:rPr>
+              <a:t>Different AI Solutions</a:t>
+            </a:r>
+          </a:p>
+          <a:p>
+            <a:r>
+              <a:rPr lang="en-US" sz="1100" dirty="0">
+                <a:solidFill>
+                  <a:schemeClr val="tx2"/>
+                </a:solidFill>
+              </a:rPr>
+              <a:t>Generative AI models</a:t>
+            </a:r>
+          </a:p>
+          <a:p>
+            <a:r>
+              <a:rPr lang="en-US" sz="1100" dirty="0">
+                <a:solidFill>
+                  <a:schemeClr val="tx2"/>
+                </a:solidFill>
+              </a:rPr>
+              <a:t>External data in </a:t>
+            </a:r>
+            <a:r>
+              <a:rPr lang="en-US" sz="1100" dirty="0" err="1">
+                <a:solidFill>
+                  <a:schemeClr val="tx2"/>
+                </a:solidFill>
+              </a:rPr>
+              <a:t>GenAI</a:t>
+            </a:r>
+            <a:endParaRPr lang="en-US" sz="1100" dirty="0">
+              <a:solidFill>
+                <a:schemeClr val="tx2"/>
+              </a:solidFill>
+            </a:endParaRPr>
+          </a:p>
+          <a:p>
+            <a:r>
+              <a:rPr lang="en-US" sz="1100" dirty="0">
+                <a:solidFill>
+                  <a:schemeClr val="tx2"/>
+                </a:solidFill>
+              </a:rPr>
+              <a:t>Retrieval augmented generation</a:t>
+            </a:r>
+          </a:p>
+          <a:p>
+            <a:r>
+              <a:rPr lang="en-US" sz="1100" dirty="0">
+                <a:solidFill>
+                  <a:schemeClr val="tx2"/>
+                </a:solidFill>
+              </a:rPr>
+              <a:t>Plugins</a:t>
+            </a:r>
+            <a:endParaRPr lang="LID4096" sz="1100" dirty="0">
+              <a:solidFill>
+                <a:schemeClr val="tx2"/>
+              </a:solidFill>
+            </a:endParaRPr>
+          </a:p>
+        </p:txBody>
+      </p:sp>
+      <p:cxnSp>
+        <p:nvCxnSpPr>
+          <p:cNvPr id="14" name="Straight Connector 13">
+            <a:extLst>
+              <a:ext uri="{FF2B5EF4-FFF2-40B4-BE49-F238E27FC236}">
+                <a16:creationId xmlns:a16="http://schemas.microsoft.com/office/drawing/2014/main" id="{6FC534FC-C775-4490-AC5A-26BD39750A6E}"/>
+              </a:ext>
+              <a:ext uri="{C183D7F6-B498-43B3-948B-1728B52AA6E4}">
+                <adec:decorative xmlns:adec="http://schemas.microsoft.com/office/drawing/2017/decorative" val="1"/>
+              </a:ext>
+            </a:extLst>
+          </p:cNvPr>
+          <p:cNvCxnSpPr>
+            <a:cxnSpLocks noGrp="1" noRot="1" noChangeAspect="1" noMove="1" noResize="1" noEditPoints="1" noAdjustHandles="1" noChangeArrowheads="1" noChangeShapeType="1"/>
+          </p:cNvCxnSpPr>
+          <p:nvPr>
+            <p:extLst>
+              <p:ext uri="{386F3935-93C4-4BCD-93E2-E3B085C9AB24}">
+                <p16:designElem xmlns:p16="http://schemas.microsoft.com/office/powerpoint/2015/main" val="1"/>
+              </p:ext>
+            </p:extLst>
+          </p:nvPr>
+        </p:nvCxnSpPr>
+        <p:spPr>
+          <a:xfrm flipH="1">
+            <a:off x="840441" y="6522756"/>
+            <a:ext cx="10717187" cy="0"/>
+          </a:xfrm>
+          <a:prstGeom prst="line">
+            <a:avLst/>
+          </a:prstGeom>
+          <a:ln w="12700" cap="sq">
+            <a:solidFill>
+              <a:schemeClr val="tx2"/>
+            </a:solidFill>
+            <a:headEnd type="none"/>
+            <a:tailEnd type="none"/>
+          </a:ln>
+        </p:spPr>
+        <p:style>
+          <a:lnRef idx="1">
+            <a:schemeClr val="accent1"/>
+          </a:lnRef>
+          <a:fillRef idx="0">
+            <a:schemeClr val="accent1"/>
+          </a:fillRef>
+          <a:effectRef idx="0">
+            <a:schemeClr val="accent1"/>
+          </a:effectRef>
+          <a:fontRef idx="minor">
+            <a:schemeClr val="tx1"/>
+          </a:fontRef>
+        </p:style>
+      </p:cxnSp>
+      <p:grpSp>
+        <p:nvGrpSpPr>
+          <p:cNvPr id="16" name="Group 15">
+            <a:extLst>
+              <a:ext uri="{FF2B5EF4-FFF2-40B4-BE49-F238E27FC236}">
+                <a16:creationId xmlns:a16="http://schemas.microsoft.com/office/drawing/2014/main" id="{4BC3ACAC-BA31-4E67-A233-03EF1A10CF15}"/>
+              </a:ext>
+              <a:ext uri="{C183D7F6-B498-43B3-948B-1728B52AA6E4}">
+                <adec:decorative xmlns:adec="http://schemas.microsoft.com/office/drawing/2017/decorative" val="1"/>
+              </a:ext>
+            </a:extLst>
+          </p:cNvPr>
+          <p:cNvGrpSpPr>
+            <a:grpSpLocks noGrp="1" noUngrp="1" noRot="1" noChangeAspect="1" noMove="1" noResize="1"/>
+          </p:cNvGrpSpPr>
+          <p:nvPr>
+            <p:extLst>
+              <p:ext uri="{386F3935-93C4-4BCD-93E2-E3B085C9AB24}">
+                <p16:designElem xmlns:p16="http://schemas.microsoft.com/office/powerpoint/2015/main" val="1"/>
+              </p:ext>
+            </p:extLst>
+          </p:nvPr>
+        </p:nvGrpSpPr>
+        <p:grpSpPr>
+          <a:xfrm>
+            <a:off x="12829917" y="6400800"/>
+            <a:ext cx="338328" cy="240175"/>
+            <a:chOff x="4089400" y="933450"/>
+            <a:chExt cx="338328" cy="341938"/>
+          </a:xfrm>
+        </p:grpSpPr>
+        <p:cxnSp>
+          <p:nvCxnSpPr>
+            <p:cNvPr id="17" name="Straight Connector 16">
+              <a:extLst>
+                <a:ext uri="{FF2B5EF4-FFF2-40B4-BE49-F238E27FC236}">
+                  <a16:creationId xmlns:a16="http://schemas.microsoft.com/office/drawing/2014/main" id="{B15509C2-092A-4956-8523-79AEC9F4FBF1}"/>
+                </a:ext>
+                <a:ext uri="{C183D7F6-B498-43B3-948B-1728B52AA6E4}">
+                  <adec:decorative xmlns:adec="http://schemas.microsoft.com/office/drawing/2017/decorative" val="1"/>
+                </a:ext>
+              </a:extLst>
+            </p:cNvPr>
+            <p:cNvCxnSpPr>
+              <a:cxnSpLocks/>
+            </p:cNvCxnSpPr>
+            <p:nvPr>
+              <p:extLst>
+                <p:ext uri="{386F3935-93C4-4BCD-93E2-E3B085C9AB24}">
+                  <p16:designElem xmlns:p16="http://schemas.microsoft.com/office/powerpoint/2015/main" val="1"/>
+                </p:ext>
+              </p:extLst>
+            </p:nvPr>
+          </p:nvCxnSpPr>
+          <p:spPr>
+            <a:xfrm>
+              <a:off x="4258564" y="933450"/>
+              <a:ext cx="0" cy="341938"/>
+            </a:xfrm>
+            <a:prstGeom prst="line">
+              <a:avLst/>
+            </a:prstGeom>
+            <a:ln w="12700">
+              <a:solidFill>
+                <a:schemeClr val="tx2"/>
+              </a:solidFill>
+            </a:ln>
+          </p:spPr>
+          <p:style>
+            <a:lnRef idx="1">
+              <a:schemeClr val="accent1"/>
+            </a:lnRef>
+            <a:fillRef idx="0">
+              <a:schemeClr val="accent1"/>
+            </a:fillRef>
+            <a:effectRef idx="0">
+              <a:schemeClr val="accent1"/>
+            </a:effectRef>
+            <a:fontRef idx="minor">
+              <a:schemeClr val="tx1"/>
+            </a:fontRef>
+          </p:style>
+        </p:cxnSp>
+        <p:cxnSp>
+          <p:nvCxnSpPr>
+            <p:cNvPr id="18" name="Straight Connector 17">
+              <a:extLst>
+                <a:ext uri="{FF2B5EF4-FFF2-40B4-BE49-F238E27FC236}">
+                  <a16:creationId xmlns:a16="http://schemas.microsoft.com/office/drawing/2014/main" id="{304B9204-F74D-4578-8B3C-3DDC87E86106}"/>
+                </a:ext>
+                <a:ext uri="{C183D7F6-B498-43B3-948B-1728B52AA6E4}">
+                  <adec:decorative xmlns:adec="http://schemas.microsoft.com/office/drawing/2017/decorative" val="1"/>
+                </a:ext>
+              </a:extLst>
+            </p:cNvPr>
+            <p:cNvCxnSpPr>
+              <a:cxnSpLocks/>
+            </p:cNvCxnSpPr>
+            <p:nvPr>
+              <p:extLst>
+                <p:ext uri="{386F3935-93C4-4BCD-93E2-E3B085C9AB24}">
+                  <p16:designElem xmlns:p16="http://schemas.microsoft.com/office/powerpoint/2015/main" val="1"/>
+                </p:ext>
+              </p:extLst>
+            </p:nvPr>
+          </p:nvCxnSpPr>
+          <p:spPr>
+            <a:xfrm>
+              <a:off x="4089400" y="1104419"/>
+              <a:ext cx="338328" cy="0"/>
+            </a:xfrm>
+            <a:prstGeom prst="line">
+              <a:avLst/>
+            </a:prstGeom>
+            <a:ln w="12700">
+              <a:solidFill>
+                <a:schemeClr val="tx2"/>
+              </a:solidFill>
+            </a:ln>
+          </p:spPr>
+          <p:style>
+            <a:lnRef idx="1">
+              <a:schemeClr val="accent1"/>
+            </a:lnRef>
+            <a:fillRef idx="0">
+              <a:schemeClr val="accent1"/>
+            </a:fillRef>
+            <a:effectRef idx="0">
+              <a:schemeClr val="accent1"/>
+            </a:effectRef>
+            <a:fontRef idx="minor">
+              <a:schemeClr val="tx1"/>
+            </a:fontRef>
+          </p:style>
+        </p:cxnSp>
+      </p:grpSp>
+    </p:spTree>
+    <p:extLst>
+      <p:ext uri="{BB962C8B-B14F-4D97-AF65-F5344CB8AC3E}">
+        <p14:creationId xmlns:p14="http://schemas.microsoft.com/office/powerpoint/2010/main" val="606134945"/>
+      </p:ext>
+    </p:extLst>
+  </p:cSld>
+  <p:clrMapOvr>
+    <a:masterClrMapping/>
+  </p:clrMapOvr>
+  <mc:AlternateContent xmlns:mc="http://schemas.openxmlformats.org/markup-compatibility/2006" xmlns:p14="http://schemas.microsoft.com/office/powerpoint/2010/main">
+    <mc:Choice Requires="p14">
+      <p:transition spd="med" p14:dur="700">
+        <p:fade/>
+      </p:transition>
+    </mc:Choice>
+    <mc:Fallback xmlns="">
+      <p:transition spd="med">
+        <p:fade/>
+      </p:transition>
+    </mc:Fallback>
+  </mc:AlternateContent>
+</p:sld>
+</file>
+
+<file path=ppt/slides/slide20.xml><?xml version="1.0" encoding="utf-8"?>
 <p:sld xmlns:a="http://schemas.openxmlformats.org/drawingml/2006/main" xmlns:r="http://schemas.openxmlformats.org/officeDocument/2006/relationships" xmlns:p="http://schemas.openxmlformats.org/presentationml/2006/main">
   <p:cSld>
     <p:bg>
@@ -28405,591 +29900,13 @@
   <p:clrMapOvr>
     <a:masterClrMapping/>
   </p:clrMapOvr>
-  <mc:AlternateContent xmlns:mc="http://schemas.openxmlformats.org/markup-compatibility/2006">
-    <mc:Choice xmlns:p14="http://schemas.microsoft.com/office/powerpoint/2010/main" Requires="p14">
+  <mc:AlternateContent xmlns:mc="http://schemas.openxmlformats.org/markup-compatibility/2006" xmlns:p14="http://schemas.microsoft.com/office/powerpoint/2010/main">
+    <mc:Choice Requires="p14">
       <p:transition spd="med" p14:dur="700">
         <p:fade/>
       </p:transition>
     </mc:Choice>
-    <mc:Fallback>
-      <p:transition spd="med">
-        <p:fade/>
-      </p:transition>
-    </mc:Fallback>
-  </mc:AlternateContent>
-</p:sld>
-</file>
-
-<file path=ppt/slides/slide2.xml><?xml version="1.0" encoding="utf-8"?>
-<p:sld xmlns:a="http://schemas.openxmlformats.org/drawingml/2006/main" xmlns:r="http://schemas.openxmlformats.org/officeDocument/2006/relationships" xmlns:p="http://schemas.openxmlformats.org/presentationml/2006/main">
-  <p:cSld>
-    <p:bg>
-      <p:bgPr>
-        <a:solidFill>
-          <a:schemeClr val="bg1"/>
-        </a:solidFill>
-        <a:effectLst/>
-      </p:bgPr>
-    </p:bg>
-    <p:spTree>
-      <p:nvGrpSpPr>
-        <p:cNvPr id="1" name=""/>
-        <p:cNvGrpSpPr/>
-        <p:nvPr/>
-      </p:nvGrpSpPr>
-      <p:grpSpPr>
-        <a:xfrm>
-          <a:off x="0" y="0"/>
-          <a:ext cx="0" cy="0"/>
-          <a:chOff x="0" y="0"/>
-          <a:chExt cx="0" cy="0"/>
-        </a:xfrm>
-      </p:grpSpPr>
-      <p:sp useBgFill="1">
-        <p:nvSpPr>
-          <p:cNvPr id="8" name="Rectangle 7">
-            <a:extLst>
-              <a:ext uri="{FF2B5EF4-FFF2-40B4-BE49-F238E27FC236}">
-                <a16:creationId xmlns:a16="http://schemas.microsoft.com/office/drawing/2014/main" id="{A27089E4-C4B8-47AC-BDA4-294EFA7CB6BF}"/>
-              </a:ext>
-              <a:ext uri="{C183D7F6-B498-43B3-948B-1728B52AA6E4}">
-                <adec:decorative xmlns:adec="http://schemas.microsoft.com/office/drawing/2017/decorative" val="1"/>
-              </a:ext>
-            </a:extLst>
-          </p:cNvPr>
-          <p:cNvSpPr>
-            <a:spLocks noGrp="1" noRot="1" noChangeAspect="1" noMove="1" noResize="1" noEditPoints="1" noAdjustHandles="1" noChangeArrowheads="1" noChangeShapeType="1" noTextEdit="1"/>
-          </p:cNvSpPr>
-          <p:nvPr>
-            <p:extLst>
-              <p:ext uri="{386F3935-93C4-4BCD-93E2-E3B085C9AB24}">
-                <p16:designElem xmlns:p16="http://schemas.microsoft.com/office/powerpoint/2015/main" val="1"/>
-              </p:ext>
-            </p:extLst>
-          </p:nvPr>
-        </p:nvSpPr>
-        <p:spPr>
-          <a:xfrm>
-            <a:off x="0" y="0"/>
-            <a:ext cx="12192000" cy="6858001"/>
-          </a:xfrm>
-          <a:prstGeom prst="rect">
-            <a:avLst/>
-          </a:prstGeom>
-          <a:ln>
-            <a:noFill/>
-          </a:ln>
-        </p:spPr>
-        <p:style>
-          <a:lnRef idx="2">
-            <a:schemeClr val="accent1">
-              <a:shade val="50000"/>
-            </a:schemeClr>
-          </a:lnRef>
-          <a:fillRef idx="1">
-            <a:schemeClr val="accent1"/>
-          </a:fillRef>
-          <a:effectRef idx="0">
-            <a:schemeClr val="accent1"/>
-          </a:effectRef>
-          <a:fontRef idx="minor">
-            <a:schemeClr val="lt1"/>
-          </a:fontRef>
-        </p:style>
-        <p:txBody>
-          <a:bodyPr rtlCol="0" anchor="ctr"/>
-          <a:lstStyle/>
-          <a:p>
-            <a:pPr algn="ctr"/>
-            <a:endParaRPr lang="en-US"/>
-          </a:p>
-        </p:txBody>
-      </p:sp>
-      <p:sp>
-        <p:nvSpPr>
-          <p:cNvPr id="2" name="Title 1">
-            <a:extLst>
-              <a:ext uri="{FF2B5EF4-FFF2-40B4-BE49-F238E27FC236}">
-                <a16:creationId xmlns:a16="http://schemas.microsoft.com/office/drawing/2014/main" id="{29579FC1-044A-E059-482C-B6BAB684D9A3}"/>
-              </a:ext>
-            </a:extLst>
-          </p:cNvPr>
-          <p:cNvSpPr>
-            <a:spLocks noGrp="1"/>
-          </p:cNvSpPr>
-          <p:nvPr>
-            <p:ph type="title"/>
-          </p:nvPr>
-        </p:nvSpPr>
-        <p:spPr>
-          <a:xfrm>
-            <a:off x="731520" y="1254408"/>
-            <a:ext cx="6092859" cy="2450817"/>
-          </a:xfrm>
-        </p:spPr>
-        <p:txBody>
-          <a:bodyPr anchor="b">
-            <a:normAutofit/>
-          </a:bodyPr>
-          <a:lstStyle/>
-          <a:p>
-            <a:r>
-              <a:rPr lang="en-US" sz="5400">
-                <a:solidFill>
-                  <a:schemeClr val="tx2"/>
-                </a:solidFill>
-              </a:rPr>
-              <a:t>Agenda</a:t>
-            </a:r>
-            <a:endParaRPr lang="LID4096" sz="5400">
-              <a:solidFill>
-                <a:schemeClr val="tx2"/>
-              </a:solidFill>
-            </a:endParaRPr>
-          </a:p>
-        </p:txBody>
-      </p:sp>
-      <p:sp>
-        <p:nvSpPr>
-          <p:cNvPr id="10" name="Rectangle 9">
-            <a:extLst>
-              <a:ext uri="{FF2B5EF4-FFF2-40B4-BE49-F238E27FC236}">
-                <a16:creationId xmlns:a16="http://schemas.microsoft.com/office/drawing/2014/main" id="{9BAFF925-4C7C-4B71-96F4-8FA90681BBF4}"/>
-              </a:ext>
-              <a:ext uri="{C183D7F6-B498-43B3-948B-1728B52AA6E4}">
-                <adec:decorative xmlns:adec="http://schemas.microsoft.com/office/drawing/2017/decorative" val="1"/>
-              </a:ext>
-            </a:extLst>
-          </p:cNvPr>
-          <p:cNvSpPr>
-            <a:spLocks noGrp="1" noRot="1" noChangeAspect="1" noMove="1" noResize="1" noEditPoints="1" noAdjustHandles="1" noChangeArrowheads="1" noChangeShapeType="1" noTextEdit="1"/>
-          </p:cNvSpPr>
-          <p:nvPr>
-            <p:extLst>
-              <p:ext uri="{386F3935-93C4-4BCD-93E2-E3B085C9AB24}">
-                <p16:designElem xmlns:p16="http://schemas.microsoft.com/office/powerpoint/2015/main" val="1"/>
-              </p:ext>
-            </p:extLst>
-          </p:nvPr>
-        </p:nvSpPr>
-        <p:spPr>
-          <a:xfrm>
-            <a:off x="0" y="0"/>
-            <a:ext cx="12192000" cy="1238031"/>
-          </a:xfrm>
-          <a:prstGeom prst="rect">
-            <a:avLst/>
-          </a:prstGeom>
-          <a:solidFill>
-            <a:schemeClr val="accent1">
-              <a:alpha val="20000"/>
-            </a:schemeClr>
-          </a:solidFill>
-          <a:ln>
-            <a:noFill/>
-          </a:ln>
-        </p:spPr>
-        <p:style>
-          <a:lnRef idx="2">
-            <a:schemeClr val="accent1">
-              <a:shade val="50000"/>
-            </a:schemeClr>
-          </a:lnRef>
-          <a:fillRef idx="1">
-            <a:schemeClr val="accent1"/>
-          </a:fillRef>
-          <a:effectRef idx="0">
-            <a:schemeClr val="accent1"/>
-          </a:effectRef>
-          <a:fontRef idx="minor">
-            <a:schemeClr val="lt1"/>
-          </a:fontRef>
-        </p:style>
-        <p:txBody>
-          <a:bodyPr rtlCol="0" anchor="ctr"/>
-          <a:lstStyle/>
-          <a:p>
-            <a:pPr algn="ctr"/>
-            <a:endParaRPr lang="en-US"/>
-          </a:p>
-        </p:txBody>
-      </p:sp>
-      <p:cxnSp>
-        <p:nvCxnSpPr>
-          <p:cNvPr id="12" name="Straight Connector 11">
-            <a:extLst>
-              <a:ext uri="{FF2B5EF4-FFF2-40B4-BE49-F238E27FC236}">
-                <a16:creationId xmlns:a16="http://schemas.microsoft.com/office/drawing/2014/main" id="{E653C820-2172-42C6-B50F-FD47A634BCD1}"/>
-              </a:ext>
-              <a:ext uri="{C183D7F6-B498-43B3-948B-1728B52AA6E4}">
-                <adec:decorative xmlns:adec="http://schemas.microsoft.com/office/drawing/2017/decorative" val="1"/>
-              </a:ext>
-            </a:extLst>
-          </p:cNvPr>
-          <p:cNvCxnSpPr>
-            <a:cxnSpLocks noGrp="1" noRot="1" noChangeAspect="1" noMove="1" noResize="1" noEditPoints="1" noAdjustHandles="1" noChangeArrowheads="1" noChangeShapeType="1"/>
-          </p:cNvCxnSpPr>
-          <p:nvPr>
-            <p:extLst>
-              <p:ext uri="{386F3935-93C4-4BCD-93E2-E3B085C9AB24}">
-                <p16:designElem xmlns:p16="http://schemas.microsoft.com/office/powerpoint/2015/main" val="1"/>
-              </p:ext>
-            </p:extLst>
-          </p:nvPr>
-        </p:nvCxnSpPr>
-        <p:spPr>
-          <a:xfrm flipH="1">
-            <a:off x="732568" y="246028"/>
-            <a:ext cx="255495" cy="546559"/>
-          </a:xfrm>
-          <a:prstGeom prst="line">
-            <a:avLst/>
-          </a:prstGeom>
-          <a:ln w="12700">
-            <a:solidFill>
-              <a:schemeClr val="tx2"/>
-            </a:solidFill>
-          </a:ln>
-        </p:spPr>
-        <p:style>
-          <a:lnRef idx="1">
-            <a:schemeClr val="accent1"/>
-          </a:lnRef>
-          <a:fillRef idx="0">
-            <a:schemeClr val="accent1"/>
-          </a:fillRef>
-          <a:effectRef idx="0">
-            <a:schemeClr val="accent1"/>
-          </a:effectRef>
-          <a:fontRef idx="minor">
-            <a:schemeClr val="tx1"/>
-          </a:fontRef>
-        </p:style>
-      </p:cxnSp>
-      <p:sp>
-        <p:nvSpPr>
-          <p:cNvPr id="3" name="Content Placeholder 2">
-            <a:extLst>
-              <a:ext uri="{FF2B5EF4-FFF2-40B4-BE49-F238E27FC236}">
-                <a16:creationId xmlns:a16="http://schemas.microsoft.com/office/drawing/2014/main" id="{0C43465B-9709-C5E0-AF80-C1B90B49BF4A}"/>
-              </a:ext>
-            </a:extLst>
-          </p:cNvPr>
-          <p:cNvSpPr>
-            <a:spLocks noGrp="1"/>
-          </p:cNvSpPr>
-          <p:nvPr>
-            <p:ph idx="1"/>
-          </p:nvPr>
-        </p:nvSpPr>
-        <p:spPr>
-          <a:xfrm>
-            <a:off x="731520" y="4069080"/>
-            <a:ext cx="6082281" cy="2042605"/>
-          </a:xfrm>
-        </p:spPr>
-        <p:txBody>
-          <a:bodyPr anchor="t">
-            <a:normAutofit/>
-          </a:bodyPr>
-          <a:lstStyle/>
-          <a:p>
-            <a:r>
-              <a:rPr lang="en-US" sz="1100" dirty="0">
-                <a:solidFill>
-                  <a:schemeClr val="tx2"/>
-                </a:solidFill>
-              </a:rPr>
-              <a:t>What is AI?</a:t>
-            </a:r>
-          </a:p>
-          <a:p>
-            <a:r>
-              <a:rPr lang="en-US" sz="1100" dirty="0">
-                <a:solidFill>
-                  <a:schemeClr val="tx2"/>
-                </a:solidFill>
-              </a:rPr>
-              <a:t>Machine learning </a:t>
-            </a:r>
-          </a:p>
-          <a:p>
-            <a:r>
-              <a:rPr lang="en-US" sz="1100" dirty="0">
-                <a:solidFill>
-                  <a:schemeClr val="tx2"/>
-                </a:solidFill>
-              </a:rPr>
-              <a:t>Different AI Solutions</a:t>
-            </a:r>
-          </a:p>
-          <a:p>
-            <a:r>
-              <a:rPr lang="en-US" sz="1100" dirty="0">
-                <a:solidFill>
-                  <a:schemeClr val="tx2"/>
-                </a:solidFill>
-              </a:rPr>
-              <a:t>Generative AI models</a:t>
-            </a:r>
-          </a:p>
-          <a:p>
-            <a:r>
-              <a:rPr lang="en-US" sz="1100" dirty="0">
-                <a:solidFill>
-                  <a:schemeClr val="tx2"/>
-                </a:solidFill>
-              </a:rPr>
-              <a:t>External data in </a:t>
-            </a:r>
-            <a:r>
-              <a:rPr lang="en-US" sz="1100" dirty="0" err="1">
-                <a:solidFill>
-                  <a:schemeClr val="tx2"/>
-                </a:solidFill>
-              </a:rPr>
-              <a:t>GenAI</a:t>
-            </a:r>
-            <a:endParaRPr lang="en-US" sz="1100" dirty="0">
-              <a:solidFill>
-                <a:schemeClr val="tx2"/>
-              </a:solidFill>
-            </a:endParaRPr>
-          </a:p>
-          <a:p>
-            <a:r>
-              <a:rPr lang="en-US" sz="1100" dirty="0">
-                <a:solidFill>
-                  <a:schemeClr val="tx2"/>
-                </a:solidFill>
-              </a:rPr>
-              <a:t>Retrieval augmented generation</a:t>
-            </a:r>
-          </a:p>
-          <a:p>
-            <a:r>
-              <a:rPr lang="en-US" sz="1100" dirty="0">
-                <a:solidFill>
-                  <a:schemeClr val="tx2"/>
-                </a:solidFill>
-              </a:rPr>
-              <a:t>Plugins</a:t>
-            </a:r>
-            <a:endParaRPr lang="LID4096" sz="1100" dirty="0">
-              <a:solidFill>
-                <a:schemeClr val="tx2"/>
-              </a:solidFill>
-            </a:endParaRPr>
-          </a:p>
-        </p:txBody>
-      </p:sp>
-      <p:cxnSp>
-        <p:nvCxnSpPr>
-          <p:cNvPr id="14" name="Straight Connector 13">
-            <a:extLst>
-              <a:ext uri="{FF2B5EF4-FFF2-40B4-BE49-F238E27FC236}">
-                <a16:creationId xmlns:a16="http://schemas.microsoft.com/office/drawing/2014/main" id="{6FC534FC-C775-4490-AC5A-26BD39750A6E}"/>
-              </a:ext>
-              <a:ext uri="{C183D7F6-B498-43B3-948B-1728B52AA6E4}">
-                <adec:decorative xmlns:adec="http://schemas.microsoft.com/office/drawing/2017/decorative" val="1"/>
-              </a:ext>
-            </a:extLst>
-          </p:cNvPr>
-          <p:cNvCxnSpPr>
-            <a:cxnSpLocks noGrp="1" noRot="1" noChangeAspect="1" noMove="1" noResize="1" noEditPoints="1" noAdjustHandles="1" noChangeArrowheads="1" noChangeShapeType="1"/>
-          </p:cNvCxnSpPr>
-          <p:nvPr>
-            <p:extLst>
-              <p:ext uri="{386F3935-93C4-4BCD-93E2-E3B085C9AB24}">
-                <p16:designElem xmlns:p16="http://schemas.microsoft.com/office/powerpoint/2015/main" val="1"/>
-              </p:ext>
-            </p:extLst>
-          </p:nvPr>
-        </p:nvCxnSpPr>
-        <p:spPr>
-          <a:xfrm flipH="1">
-            <a:off x="840441" y="6522756"/>
-            <a:ext cx="10717187" cy="0"/>
-          </a:xfrm>
-          <a:prstGeom prst="line">
-            <a:avLst/>
-          </a:prstGeom>
-          <a:ln w="12700" cap="sq">
-            <a:solidFill>
-              <a:schemeClr val="tx2"/>
-            </a:solidFill>
-            <a:headEnd type="none"/>
-            <a:tailEnd type="none"/>
-          </a:ln>
-        </p:spPr>
-        <p:style>
-          <a:lnRef idx="1">
-            <a:schemeClr val="accent1"/>
-          </a:lnRef>
-          <a:fillRef idx="0">
-            <a:schemeClr val="accent1"/>
-          </a:fillRef>
-          <a:effectRef idx="0">
-            <a:schemeClr val="accent1"/>
-          </a:effectRef>
-          <a:fontRef idx="minor">
-            <a:schemeClr val="tx1"/>
-          </a:fontRef>
-        </p:style>
-      </p:cxnSp>
-      <p:grpSp>
-        <p:nvGrpSpPr>
-          <p:cNvPr id="16" name="Group 15">
-            <a:extLst>
-              <a:ext uri="{FF2B5EF4-FFF2-40B4-BE49-F238E27FC236}">
-                <a16:creationId xmlns:a16="http://schemas.microsoft.com/office/drawing/2014/main" id="{4BC3ACAC-BA31-4E67-A233-03EF1A10CF15}"/>
-              </a:ext>
-              <a:ext uri="{C183D7F6-B498-43B3-948B-1728B52AA6E4}">
-                <adec:decorative xmlns:adec="http://schemas.microsoft.com/office/drawing/2017/decorative" val="1"/>
-              </a:ext>
-            </a:extLst>
-          </p:cNvPr>
-          <p:cNvGrpSpPr>
-            <a:grpSpLocks noGrp="1" noUngrp="1" noRot="1" noChangeAspect="1" noMove="1" noResize="1"/>
-          </p:cNvGrpSpPr>
-          <p:nvPr>
-            <p:extLst>
-              <p:ext uri="{386F3935-93C4-4BCD-93E2-E3B085C9AB24}">
-                <p16:designElem xmlns:p16="http://schemas.microsoft.com/office/powerpoint/2015/main" val="1"/>
-              </p:ext>
-            </p:extLst>
-          </p:nvPr>
-        </p:nvGrpSpPr>
-        <p:grpSpPr>
-          <a:xfrm>
-            <a:off x="12829917" y="6400800"/>
-            <a:ext cx="338328" cy="240175"/>
-            <a:chOff x="4089400" y="933450"/>
-            <a:chExt cx="338328" cy="341938"/>
-          </a:xfrm>
-        </p:grpSpPr>
-        <p:cxnSp>
-          <p:nvCxnSpPr>
-            <p:cNvPr id="17" name="Straight Connector 16">
-              <a:extLst>
-                <a:ext uri="{FF2B5EF4-FFF2-40B4-BE49-F238E27FC236}">
-                  <a16:creationId xmlns:a16="http://schemas.microsoft.com/office/drawing/2014/main" id="{B15509C2-092A-4956-8523-79AEC9F4FBF1}"/>
-                </a:ext>
-                <a:ext uri="{C183D7F6-B498-43B3-948B-1728B52AA6E4}">
-                  <adec:decorative xmlns:adec="http://schemas.microsoft.com/office/drawing/2017/decorative" val="1"/>
-                </a:ext>
-              </a:extLst>
-            </p:cNvPr>
-            <p:cNvCxnSpPr>
-              <a:cxnSpLocks/>
-            </p:cNvCxnSpPr>
-            <p:nvPr>
-              <p:extLst>
-                <p:ext uri="{386F3935-93C4-4BCD-93E2-E3B085C9AB24}">
-                  <p16:designElem xmlns:p16="http://schemas.microsoft.com/office/powerpoint/2015/main" val="1"/>
-                </p:ext>
-              </p:extLst>
-            </p:nvPr>
-          </p:nvCxnSpPr>
-          <p:spPr>
-            <a:xfrm>
-              <a:off x="4258564" y="933450"/>
-              <a:ext cx="0" cy="341938"/>
-            </a:xfrm>
-            <a:prstGeom prst="line">
-              <a:avLst/>
-            </a:prstGeom>
-            <a:ln w="12700">
-              <a:solidFill>
-                <a:schemeClr val="tx2"/>
-              </a:solidFill>
-            </a:ln>
-          </p:spPr>
-          <p:style>
-            <a:lnRef idx="1">
-              <a:schemeClr val="accent1"/>
-            </a:lnRef>
-            <a:fillRef idx="0">
-              <a:schemeClr val="accent1"/>
-            </a:fillRef>
-            <a:effectRef idx="0">
-              <a:schemeClr val="accent1"/>
-            </a:effectRef>
-            <a:fontRef idx="minor">
-              <a:schemeClr val="tx1"/>
-            </a:fontRef>
-          </p:style>
-        </p:cxnSp>
-        <p:cxnSp>
-          <p:nvCxnSpPr>
-            <p:cNvPr id="18" name="Straight Connector 17">
-              <a:extLst>
-                <a:ext uri="{FF2B5EF4-FFF2-40B4-BE49-F238E27FC236}">
-                  <a16:creationId xmlns:a16="http://schemas.microsoft.com/office/drawing/2014/main" id="{304B9204-F74D-4578-8B3C-3DDC87E86106}"/>
-                </a:ext>
-                <a:ext uri="{C183D7F6-B498-43B3-948B-1728B52AA6E4}">
-                  <adec:decorative xmlns:adec="http://schemas.microsoft.com/office/drawing/2017/decorative" val="1"/>
-                </a:ext>
-              </a:extLst>
-            </p:cNvPr>
-            <p:cNvCxnSpPr>
-              <a:cxnSpLocks/>
-            </p:cNvCxnSpPr>
-            <p:nvPr>
-              <p:extLst>
-                <p:ext uri="{386F3935-93C4-4BCD-93E2-E3B085C9AB24}">
-                  <p16:designElem xmlns:p16="http://schemas.microsoft.com/office/powerpoint/2015/main" val="1"/>
-                </p:ext>
-              </p:extLst>
-            </p:nvPr>
-          </p:nvCxnSpPr>
-          <p:spPr>
-            <a:xfrm>
-              <a:off x="4089400" y="1104419"/>
-              <a:ext cx="338328" cy="0"/>
-            </a:xfrm>
-            <a:prstGeom prst="line">
-              <a:avLst/>
-            </a:prstGeom>
-            <a:ln w="12700">
-              <a:solidFill>
-                <a:schemeClr val="tx2"/>
-              </a:solidFill>
-            </a:ln>
-          </p:spPr>
-          <p:style>
-            <a:lnRef idx="1">
-              <a:schemeClr val="accent1"/>
-            </a:lnRef>
-            <a:fillRef idx="0">
-              <a:schemeClr val="accent1"/>
-            </a:fillRef>
-            <a:effectRef idx="0">
-              <a:schemeClr val="accent1"/>
-            </a:effectRef>
-            <a:fontRef idx="minor">
-              <a:schemeClr val="tx1"/>
-            </a:fontRef>
-          </p:style>
-        </p:cxnSp>
-      </p:grpSp>
-    </p:spTree>
-    <p:extLst>
-      <p:ext uri="{BB962C8B-B14F-4D97-AF65-F5344CB8AC3E}">
-        <p14:creationId xmlns:p14="http://schemas.microsoft.com/office/powerpoint/2010/main" val="606134945"/>
-      </p:ext>
-    </p:extLst>
-  </p:cSld>
-  <p:clrMapOvr>
-    <a:masterClrMapping/>
-  </p:clrMapOvr>
-  <mc:AlternateContent xmlns:mc="http://schemas.openxmlformats.org/markup-compatibility/2006">
-    <mc:Choice xmlns:p14="http://schemas.microsoft.com/office/powerpoint/2010/main" Requires="p14">
-      <p:transition spd="med" p14:dur="700">
-        <p:fade/>
-      </p:transition>
-    </mc:Choice>
-    <mc:Fallback>
+    <mc:Fallback xmlns="">
       <p:transition spd="med">
         <p:fade/>
       </p:transition>
@@ -29687,13 +30604,13 @@
   <p:clrMapOvr>
     <a:masterClrMapping/>
   </p:clrMapOvr>
-  <mc:AlternateContent xmlns:mc="http://schemas.openxmlformats.org/markup-compatibility/2006">
-    <mc:Choice xmlns:p14="http://schemas.microsoft.com/office/powerpoint/2010/main" Requires="p14">
+  <mc:AlternateContent xmlns:mc="http://schemas.openxmlformats.org/markup-compatibility/2006" xmlns:p14="http://schemas.microsoft.com/office/powerpoint/2010/main">
+    <mc:Choice Requires="p14">
       <p:transition spd="med" p14:dur="700">
         <p:fade/>
       </p:transition>
     </mc:Choice>
-    <mc:Fallback>
+    <mc:Fallback xmlns="">
       <p:transition spd="med">
         <p:fade/>
       </p:transition>
@@ -30232,13 +31149,13 @@
   <p:clrMapOvr>
     <a:masterClrMapping/>
   </p:clrMapOvr>
-  <mc:AlternateContent xmlns:mc="http://schemas.openxmlformats.org/markup-compatibility/2006">
-    <mc:Choice xmlns:p14="http://schemas.microsoft.com/office/powerpoint/2010/main" Requires="p14">
+  <mc:AlternateContent xmlns:mc="http://schemas.openxmlformats.org/markup-compatibility/2006" xmlns:p14="http://schemas.microsoft.com/office/powerpoint/2010/main">
+    <mc:Choice Requires="p14">
       <p:transition spd="med" p14:dur="700">
         <p:fade/>
       </p:transition>
     </mc:Choice>
-    <mc:Fallback>
+    <mc:Fallback xmlns="">
       <p:transition spd="med">
         <p:fade/>
       </p:transition>
@@ -31066,13 +31983,13 @@
   <p:clrMapOvr>
     <a:masterClrMapping/>
   </p:clrMapOvr>
-  <mc:AlternateContent xmlns:mc="http://schemas.openxmlformats.org/markup-compatibility/2006">
-    <mc:Choice xmlns:p14="http://schemas.microsoft.com/office/powerpoint/2010/main" Requires="p14">
+  <mc:AlternateContent xmlns:mc="http://schemas.openxmlformats.org/markup-compatibility/2006" xmlns:p14="http://schemas.microsoft.com/office/powerpoint/2010/main">
+    <mc:Choice Requires="p14">
       <p:transition spd="med" p14:dur="700">
         <p:fade/>
       </p:transition>
     </mc:Choice>
-    <mc:Fallback>
+    <mc:Fallback xmlns="">
       <p:transition spd="med">
         <p:fade/>
       </p:transition>
@@ -31558,13 +32475,13 @@
   <p:clrMapOvr>
     <a:masterClrMapping/>
   </p:clrMapOvr>
-  <mc:AlternateContent xmlns:mc="http://schemas.openxmlformats.org/markup-compatibility/2006">
-    <mc:Choice xmlns:p159="http://schemas.microsoft.com/office/powerpoint/2015/09/main" Requires="p159">
+  <mc:AlternateContent xmlns:mc="http://schemas.openxmlformats.org/markup-compatibility/2006" xmlns:p159="http://schemas.microsoft.com/office/powerpoint/2015/09/main">
+    <mc:Choice Requires="p159">
       <p:transition xmlns:p14="http://schemas.microsoft.com/office/powerpoint/2010/main" spd="slow" p14:dur="2000">
         <p159:morph option="byObject"/>
       </p:transition>
     </mc:Choice>
-    <mc:Fallback>
+    <mc:Fallback xmlns="">
       <p:transition spd="slow">
         <p:fade/>
       </p:transition>
@@ -32128,13 +33045,13 @@
   <p:clrMapOvr>
     <a:masterClrMapping/>
   </p:clrMapOvr>
-  <mc:AlternateContent xmlns:mc="http://schemas.openxmlformats.org/markup-compatibility/2006">
-    <mc:Choice xmlns:p14="http://schemas.microsoft.com/office/powerpoint/2010/main" Requires="p14">
+  <mc:AlternateContent xmlns:mc="http://schemas.openxmlformats.org/markup-compatibility/2006" xmlns:p14="http://schemas.microsoft.com/office/powerpoint/2010/main">
+    <mc:Choice Requires="p14">
       <p:transition spd="med" p14:dur="700">
         <p:fade/>
       </p:transition>
     </mc:Choice>
-    <mc:Fallback>
+    <mc:Fallback xmlns="">
       <p:transition spd="med">
         <p:fade/>
       </p:transition>
@@ -32615,13 +33532,13 @@
   <p:clrMapOvr>
     <a:masterClrMapping/>
   </p:clrMapOvr>
-  <mc:AlternateContent xmlns:mc="http://schemas.openxmlformats.org/markup-compatibility/2006">
-    <mc:Choice xmlns:p14="http://schemas.microsoft.com/office/powerpoint/2010/main" Requires="p14">
+  <mc:AlternateContent xmlns:mc="http://schemas.openxmlformats.org/markup-compatibility/2006" xmlns:p14="http://schemas.microsoft.com/office/powerpoint/2010/main">
+    <mc:Choice Requires="p14">
       <p:transition spd="med" p14:dur="700">
         <p:fade/>
       </p:transition>
     </mc:Choice>
-    <mc:Fallback>
+    <mc:Fallback xmlns="">
       <p:transition spd="med">
         <p:fade/>
       </p:transition>
@@ -33135,13 +34052,13 @@
   <p:clrMapOvr>
     <a:masterClrMapping/>
   </p:clrMapOvr>
-  <mc:AlternateContent xmlns:mc="http://schemas.openxmlformats.org/markup-compatibility/2006">
-    <mc:Choice xmlns:p159="http://schemas.microsoft.com/office/powerpoint/2015/09/main" Requires="p159">
+  <mc:AlternateContent xmlns:mc="http://schemas.openxmlformats.org/markup-compatibility/2006" xmlns:p159="http://schemas.microsoft.com/office/powerpoint/2015/09/main">
+    <mc:Choice Requires="p159">
       <p:transition xmlns:p14="http://schemas.microsoft.com/office/powerpoint/2010/main" spd="slow" p14:dur="2000">
         <p159:morph option="byObject"/>
       </p:transition>
     </mc:Choice>
-    <mc:Fallback>
+    <mc:Fallback xmlns="">
       <p:transition spd="slow">
         <p:fade/>
       </p:transition>

</xml_diff>